<commit_message>
Updating Some Tutorial Material
Updating Tutorial Materials and created a configuration file for tutorial: Building Environments
</commit_message>
<xml_diff>
--- a/Assets/StreamingAssets/2D_Objects/Tutorial_Instructions/~Tutorial Instructions.pptx
+++ b/Assets/StreamingAssets/2D_Objects/Tutorial_Instructions/~Tutorial Instructions.pptx
@@ -265,7 +265,7 @@
           <a:p>
             <a:fld id="{43D9F887-C526-42E2-BE1C-7F1C55940A26}" type="datetimeFigureOut">
               <a:rPr lang="en-US" smtClean="0"/>
-              <a:t>1/25/2020</a:t>
+              <a:t>1/26/2020</a:t>
             </a:fld>
             <a:endParaRPr lang="en-US"/>
           </a:p>
@@ -463,7 +463,7 @@
           <a:p>
             <a:fld id="{43D9F887-C526-42E2-BE1C-7F1C55940A26}" type="datetimeFigureOut">
               <a:rPr lang="en-US" smtClean="0"/>
-              <a:t>1/25/2020</a:t>
+              <a:t>1/26/2020</a:t>
             </a:fld>
             <a:endParaRPr lang="en-US"/>
           </a:p>
@@ -671,7 +671,7 @@
           <a:p>
             <a:fld id="{43D9F887-C526-42E2-BE1C-7F1C55940A26}" type="datetimeFigureOut">
               <a:rPr lang="en-US" smtClean="0"/>
-              <a:t>1/25/2020</a:t>
+              <a:t>1/26/2020</a:t>
             </a:fld>
             <a:endParaRPr lang="en-US"/>
           </a:p>
@@ -869,7 +869,7 @@
           <a:p>
             <a:fld id="{43D9F887-C526-42E2-BE1C-7F1C55940A26}" type="datetimeFigureOut">
               <a:rPr lang="en-US" smtClean="0"/>
-              <a:t>1/25/2020</a:t>
+              <a:t>1/26/2020</a:t>
             </a:fld>
             <a:endParaRPr lang="en-US"/>
           </a:p>
@@ -1144,7 +1144,7 @@
           <a:p>
             <a:fld id="{43D9F887-C526-42E2-BE1C-7F1C55940A26}" type="datetimeFigureOut">
               <a:rPr lang="en-US" smtClean="0"/>
-              <a:t>1/25/2020</a:t>
+              <a:t>1/26/2020</a:t>
             </a:fld>
             <a:endParaRPr lang="en-US"/>
           </a:p>
@@ -1409,7 +1409,7 @@
           <a:p>
             <a:fld id="{43D9F887-C526-42E2-BE1C-7F1C55940A26}" type="datetimeFigureOut">
               <a:rPr lang="en-US" smtClean="0"/>
-              <a:t>1/25/2020</a:t>
+              <a:t>1/26/2020</a:t>
             </a:fld>
             <a:endParaRPr lang="en-US"/>
           </a:p>
@@ -1821,7 +1821,7 @@
           <a:p>
             <a:fld id="{43D9F887-C526-42E2-BE1C-7F1C55940A26}" type="datetimeFigureOut">
               <a:rPr lang="en-US" smtClean="0"/>
-              <a:t>1/25/2020</a:t>
+              <a:t>1/26/2020</a:t>
             </a:fld>
             <a:endParaRPr lang="en-US"/>
           </a:p>
@@ -1962,7 +1962,7 @@
           <a:p>
             <a:fld id="{43D9F887-C526-42E2-BE1C-7F1C55940A26}" type="datetimeFigureOut">
               <a:rPr lang="en-US" smtClean="0"/>
-              <a:t>1/25/2020</a:t>
+              <a:t>1/26/2020</a:t>
             </a:fld>
             <a:endParaRPr lang="en-US"/>
           </a:p>
@@ -2075,7 +2075,7 @@
           <a:p>
             <a:fld id="{43D9F887-C526-42E2-BE1C-7F1C55940A26}" type="datetimeFigureOut">
               <a:rPr lang="en-US" smtClean="0"/>
-              <a:t>1/25/2020</a:t>
+              <a:t>1/26/2020</a:t>
             </a:fld>
             <a:endParaRPr lang="en-US"/>
           </a:p>
@@ -2386,7 +2386,7 @@
           <a:p>
             <a:fld id="{43D9F887-C526-42E2-BE1C-7F1C55940A26}" type="datetimeFigureOut">
               <a:rPr lang="en-US" smtClean="0"/>
-              <a:t>1/25/2020</a:t>
+              <a:t>1/26/2020</a:t>
             </a:fld>
             <a:endParaRPr lang="en-US"/>
           </a:p>
@@ -2674,7 +2674,7 @@
           <a:p>
             <a:fld id="{43D9F887-C526-42E2-BE1C-7F1C55940A26}" type="datetimeFigureOut">
               <a:rPr lang="en-US" smtClean="0"/>
-              <a:t>1/25/2020</a:t>
+              <a:t>1/26/2020</a:t>
             </a:fld>
             <a:endParaRPr lang="en-US"/>
           </a:p>
@@ -2915,7 +2915,7 @@
           <a:p>
             <a:fld id="{43D9F887-C526-42E2-BE1C-7F1C55940A26}" type="datetimeFigureOut">
               <a:rPr lang="en-US" smtClean="0"/>
-              <a:t>1/25/2020</a:t>
+              <a:t>1/26/2020</a:t>
             </a:fld>
             <a:endParaRPr lang="en-US"/>
           </a:p>
@@ -4377,19 +4377,10 @@
           <a:p>
             <a:pPr algn="ctr"/>
             <a:r>
-              <a:rPr lang="en-US" sz="2800" b="1" dirty="0"/>
-              <a:t>Do you have any questions about this portion of the experiment?</a:t>
-            </a:r>
-            <a:br>
-              <a:rPr lang="en-US" sz="2800" dirty="0"/>
-            </a:br>
-            <a:br>
-              <a:rPr lang="en-US" sz="2800" dirty="0"/>
-            </a:br>
-            <a:r>
-              <a:rPr lang="en-US" sz="2800" dirty="0"/>
-              <a:t>The experimenter will now leave the room and let you continue on your own. When this portion of the experiment is over you will be asked to notify the experimenter. </a:t>
-            </a:r>
+              <a:rPr lang="en-US" sz="6000" b="1" dirty="0"/>
+              <a:t>Get Ready!</a:t>
+            </a:r>
+            <a:endParaRPr lang="en-US" sz="6000" dirty="0"/>
           </a:p>
         </p:txBody>
       </p:sp>
@@ -4986,7 +4977,7 @@
         </p:spPr>
         <p:txBody>
           <a:bodyPr>
-            <a:normAutofit fontScale="90000"/>
+            <a:normAutofit/>
           </a:bodyPr>
           <a:lstStyle/>
           <a:p>
@@ -5003,7 +4994,7 @@
             </a:br>
             <a:r>
               <a:rPr lang="en-US" dirty="0"/>
-              <a:t>Please notify the experimenter that you have completed this portion of the experiment.</a:t>
+              <a:t>You’ve completed the experiment!</a:t>
             </a:r>
           </a:p>
         </p:txBody>

</xml_diff>

<commit_message>
Changed naming of RandomGroup and RandomTrial Type
Changed RandomTrialType to RandomlySelect and changed RandomGroup to Order. This was done to make the syntax a little more intuitive
</commit_message>
<xml_diff>
--- a/Assets/StreamingAssets/2D_Objects/Tutorial_Instructions/~Tutorial Instructions.pptx
+++ b/Assets/StreamingAssets/2D_Objects/Tutorial_Instructions/~Tutorial Instructions.pptx
@@ -11,7 +11,10 @@
     <p:sldId id="270" r:id="rId5"/>
     <p:sldId id="278" r:id="rId6"/>
     <p:sldId id="276" r:id="rId7"/>
-    <p:sldId id="262" r:id="rId8"/>
+    <p:sldId id="279" r:id="rId8"/>
+    <p:sldId id="280" r:id="rId9"/>
+    <p:sldId id="281" r:id="rId10"/>
+    <p:sldId id="262" r:id="rId11"/>
   </p:sldIdLst>
   <p:sldSz cx="12192000" cy="6858000"/>
   <p:notesSz cx="6858000" cy="9144000"/>
@@ -265,7 +268,7 @@
           <a:p>
             <a:fld id="{43D9F887-C526-42E2-BE1C-7F1C55940A26}" type="datetimeFigureOut">
               <a:rPr lang="en-US" smtClean="0"/>
-              <a:t>1/26/2020</a:t>
+              <a:t>1/31/2020</a:t>
             </a:fld>
             <a:endParaRPr lang="en-US"/>
           </a:p>
@@ -463,7 +466,7 @@
           <a:p>
             <a:fld id="{43D9F887-C526-42E2-BE1C-7F1C55940A26}" type="datetimeFigureOut">
               <a:rPr lang="en-US" smtClean="0"/>
-              <a:t>1/26/2020</a:t>
+              <a:t>1/31/2020</a:t>
             </a:fld>
             <a:endParaRPr lang="en-US"/>
           </a:p>
@@ -671,7 +674,7 @@
           <a:p>
             <a:fld id="{43D9F887-C526-42E2-BE1C-7F1C55940A26}" type="datetimeFigureOut">
               <a:rPr lang="en-US" smtClean="0"/>
-              <a:t>1/26/2020</a:t>
+              <a:t>1/31/2020</a:t>
             </a:fld>
             <a:endParaRPr lang="en-US"/>
           </a:p>
@@ -869,7 +872,7 @@
           <a:p>
             <a:fld id="{43D9F887-C526-42E2-BE1C-7F1C55940A26}" type="datetimeFigureOut">
               <a:rPr lang="en-US" smtClean="0"/>
-              <a:t>1/26/2020</a:t>
+              <a:t>1/31/2020</a:t>
             </a:fld>
             <a:endParaRPr lang="en-US"/>
           </a:p>
@@ -1144,7 +1147,7 @@
           <a:p>
             <a:fld id="{43D9F887-C526-42E2-BE1C-7F1C55940A26}" type="datetimeFigureOut">
               <a:rPr lang="en-US" smtClean="0"/>
-              <a:t>1/26/2020</a:t>
+              <a:t>1/31/2020</a:t>
             </a:fld>
             <a:endParaRPr lang="en-US"/>
           </a:p>
@@ -1409,7 +1412,7 @@
           <a:p>
             <a:fld id="{43D9F887-C526-42E2-BE1C-7F1C55940A26}" type="datetimeFigureOut">
               <a:rPr lang="en-US" smtClean="0"/>
-              <a:t>1/26/2020</a:t>
+              <a:t>1/31/2020</a:t>
             </a:fld>
             <a:endParaRPr lang="en-US"/>
           </a:p>
@@ -1821,7 +1824,7 @@
           <a:p>
             <a:fld id="{43D9F887-C526-42E2-BE1C-7F1C55940A26}" type="datetimeFigureOut">
               <a:rPr lang="en-US" smtClean="0"/>
-              <a:t>1/26/2020</a:t>
+              <a:t>1/31/2020</a:t>
             </a:fld>
             <a:endParaRPr lang="en-US"/>
           </a:p>
@@ -1962,7 +1965,7 @@
           <a:p>
             <a:fld id="{43D9F887-C526-42E2-BE1C-7F1C55940A26}" type="datetimeFigureOut">
               <a:rPr lang="en-US" smtClean="0"/>
-              <a:t>1/26/2020</a:t>
+              <a:t>1/31/2020</a:t>
             </a:fld>
             <a:endParaRPr lang="en-US"/>
           </a:p>
@@ -2075,7 +2078,7 @@
           <a:p>
             <a:fld id="{43D9F887-C526-42E2-BE1C-7F1C55940A26}" type="datetimeFigureOut">
               <a:rPr lang="en-US" smtClean="0"/>
-              <a:t>1/26/2020</a:t>
+              <a:t>1/31/2020</a:t>
             </a:fld>
             <a:endParaRPr lang="en-US"/>
           </a:p>
@@ -2386,7 +2389,7 @@
           <a:p>
             <a:fld id="{43D9F887-C526-42E2-BE1C-7F1C55940A26}" type="datetimeFigureOut">
               <a:rPr lang="en-US" smtClean="0"/>
-              <a:t>1/26/2020</a:t>
+              <a:t>1/31/2020</a:t>
             </a:fld>
             <a:endParaRPr lang="en-US"/>
           </a:p>
@@ -2674,7 +2677,7 @@
           <a:p>
             <a:fld id="{43D9F887-C526-42E2-BE1C-7F1C55940A26}" type="datetimeFigureOut">
               <a:rPr lang="en-US" smtClean="0"/>
-              <a:t>1/26/2020</a:t>
+              <a:t>1/31/2020</a:t>
             </a:fld>
             <a:endParaRPr lang="en-US"/>
           </a:p>
@@ -2915,7 +2918,7 @@
           <a:p>
             <a:fld id="{43D9F887-C526-42E2-BE1C-7F1C55940A26}" type="datetimeFigureOut">
               <a:rPr lang="en-US" smtClean="0"/>
-              <a:t>1/26/2020</a:t>
+              <a:t>1/31/2020</a:t>
             </a:fld>
             <a:endParaRPr lang="en-US"/>
           </a:p>
@@ -3416,6 +3419,82 @@
 </p:sld>
 </file>
 
+<file path=ppt/slides/slide10.xml><?xml version="1.0" encoding="utf-8"?>
+<p:sld xmlns:a="http://schemas.openxmlformats.org/drawingml/2006/main" xmlns:r="http://schemas.openxmlformats.org/officeDocument/2006/relationships" xmlns:p="http://schemas.openxmlformats.org/presentationml/2006/main">
+  <p:cSld>
+    <p:spTree>
+      <p:nvGrpSpPr>
+        <p:cNvPr id="1" name=""/>
+        <p:cNvGrpSpPr/>
+        <p:nvPr/>
+      </p:nvGrpSpPr>
+      <p:grpSpPr>
+        <a:xfrm>
+          <a:off x="0" y="0"/>
+          <a:ext cx="0" cy="0"/>
+          <a:chOff x="0" y="0"/>
+          <a:chExt cx="0" cy="0"/>
+        </a:xfrm>
+      </p:grpSpPr>
+      <p:sp>
+        <p:nvSpPr>
+          <p:cNvPr id="2" name="Title 1">
+            <a:extLst>
+              <a:ext uri="{FF2B5EF4-FFF2-40B4-BE49-F238E27FC236}">
+                <a16:creationId xmlns:a16="http://schemas.microsoft.com/office/drawing/2014/main" id="{897D8E5E-9252-4150-97C4-51C3C2C38837}"/>
+              </a:ext>
+            </a:extLst>
+          </p:cNvPr>
+          <p:cNvSpPr>
+            <a:spLocks noGrp="1"/>
+          </p:cNvSpPr>
+          <p:nvPr>
+            <p:ph type="title"/>
+          </p:nvPr>
+        </p:nvSpPr>
+        <p:spPr>
+          <a:xfrm>
+            <a:off x="838200" y="1960306"/>
+            <a:ext cx="10515600" cy="2343056"/>
+          </a:xfrm>
+        </p:spPr>
+        <p:txBody>
+          <a:bodyPr>
+            <a:normAutofit/>
+          </a:bodyPr>
+          <a:lstStyle/>
+          <a:p>
+            <a:pPr algn="ctr"/>
+            <a:r>
+              <a:rPr lang="en-US" b="1" dirty="0"/>
+              <a:t>Great Work!</a:t>
+            </a:r>
+            <a:br>
+              <a:rPr lang="en-US" dirty="0"/>
+            </a:br>
+            <a:br>
+              <a:rPr lang="en-US" dirty="0"/>
+            </a:br>
+            <a:r>
+              <a:rPr lang="en-US" dirty="0"/>
+              <a:t>You’ve completed the experiment!</a:t>
+            </a:r>
+          </a:p>
+        </p:txBody>
+      </p:sp>
+    </p:spTree>
+    <p:extLst>
+      <p:ext uri="{BB962C8B-B14F-4D97-AF65-F5344CB8AC3E}">
+        <p14:creationId xmlns:p14="http://schemas.microsoft.com/office/powerpoint/2010/main" val="448000115"/>
+      </p:ext>
+    </p:extLst>
+  </p:cSld>
+  <p:clrMapOvr>
+    <a:masterClrMapping/>
+  </p:clrMapOvr>
+</p:sld>
+</file>
+
 <file path=ppt/slides/slide2.xml><?xml version="1.0" encoding="utf-8"?>
 <p:sld xmlns:a="http://schemas.openxmlformats.org/drawingml/2006/main" xmlns:r="http://schemas.openxmlformats.org/officeDocument/2006/relationships" xmlns:p="http://schemas.openxmlformats.org/presentationml/2006/main">
   <p:cSld>
@@ -4958,51 +5037,272 @@
           <p:cNvPr id="2" name="Title 1">
             <a:extLst>
               <a:ext uri="{FF2B5EF4-FFF2-40B4-BE49-F238E27FC236}">
-                <a16:creationId xmlns:a16="http://schemas.microsoft.com/office/drawing/2014/main" id="{897D8E5E-9252-4150-97C4-51C3C2C38837}"/>
-              </a:ext>
-            </a:extLst>
-          </p:cNvPr>
-          <p:cNvSpPr>
-            <a:spLocks noGrp="1"/>
-          </p:cNvSpPr>
-          <p:nvPr>
-            <p:ph type="title"/>
+                <a16:creationId xmlns:a16="http://schemas.microsoft.com/office/drawing/2014/main" id="{3823ED87-AD32-4739-9C5C-208049C1F2A7}"/>
+              </a:ext>
+            </a:extLst>
+          </p:cNvPr>
+          <p:cNvSpPr>
+            <a:spLocks noGrp="1"/>
+          </p:cNvSpPr>
+          <p:nvPr>
+            <p:ph type="ctrTitle"/>
           </p:nvPr>
         </p:nvSpPr>
         <p:spPr>
           <a:xfrm>
-            <a:off x="838200" y="1960306"/>
-            <a:ext cx="10515600" cy="2343056"/>
+            <a:off x="1523999" y="220738"/>
+            <a:ext cx="9144000" cy="1008552"/>
           </a:xfrm>
         </p:spPr>
         <p:txBody>
-          <a:bodyPr>
-            <a:normAutofit/>
-          </a:bodyPr>
-          <a:lstStyle/>
-          <a:p>
-            <a:pPr algn="ctr"/>
+          <a:bodyPr/>
+          <a:lstStyle/>
+          <a:p>
             <a:r>
               <a:rPr lang="en-US" b="1" dirty="0"/>
-              <a:t>Great Work!</a:t>
-            </a:r>
-            <a:br>
-              <a:rPr lang="en-US" dirty="0"/>
-            </a:br>
-            <a:br>
-              <a:rPr lang="en-US" dirty="0"/>
-            </a:br>
-            <a:r>
-              <a:rPr lang="en-US" dirty="0"/>
-              <a:t>You’ve completed the experiment!</a:t>
-            </a:r>
-          </a:p>
-        </p:txBody>
-      </p:sp>
+              <a:t>Find</a:t>
+            </a:r>
+          </a:p>
+        </p:txBody>
+      </p:sp>
+      <p:pic>
+        <p:nvPicPr>
+          <p:cNvPr id="14" name="Picture 13" descr="A picture containing sitting, laying&#10;&#10;Description automatically generated">
+            <a:extLst>
+              <a:ext uri="{FF2B5EF4-FFF2-40B4-BE49-F238E27FC236}">
+                <a16:creationId xmlns:a16="http://schemas.microsoft.com/office/drawing/2014/main" id="{125EED36-0B92-46E5-AA24-EE9E62244456}"/>
+              </a:ext>
+            </a:extLst>
+          </p:cNvPr>
+          <p:cNvPicPr>
+            <a:picLocks noChangeAspect="1"/>
+          </p:cNvPicPr>
+          <p:nvPr/>
+        </p:nvPicPr>
+        <p:blipFill>
+          <a:blip r:embed="rId2">
+            <a:extLst>
+              <a:ext uri="{28A0092B-C50C-407E-A947-70E740481C1C}">
+                <a14:useLocalDpi xmlns:a14="http://schemas.microsoft.com/office/drawing/2010/main" val="0"/>
+              </a:ext>
+            </a:extLst>
+          </a:blip>
+          <a:stretch>
+            <a:fillRect/>
+          </a:stretch>
+        </p:blipFill>
+        <p:spPr>
+          <a:xfrm>
+            <a:off x="4010022" y="1382656"/>
+            <a:ext cx="4171955" cy="4092688"/>
+          </a:xfrm>
+          <a:prstGeom prst="rect">
+            <a:avLst/>
+          </a:prstGeom>
+        </p:spPr>
+      </p:pic>
     </p:spTree>
     <p:extLst>
       <p:ext uri="{BB962C8B-B14F-4D97-AF65-F5344CB8AC3E}">
-        <p14:creationId xmlns:p14="http://schemas.microsoft.com/office/powerpoint/2010/main" val="448000115"/>
+        <p14:creationId xmlns:p14="http://schemas.microsoft.com/office/powerpoint/2010/main" val="3679336169"/>
+      </p:ext>
+    </p:extLst>
+  </p:cSld>
+  <p:clrMapOvr>
+    <a:masterClrMapping/>
+  </p:clrMapOvr>
+</p:sld>
+</file>
+
+<file path=ppt/slides/slide8.xml><?xml version="1.0" encoding="utf-8"?>
+<p:sld xmlns:a="http://schemas.openxmlformats.org/drawingml/2006/main" xmlns:r="http://schemas.openxmlformats.org/officeDocument/2006/relationships" xmlns:p="http://schemas.openxmlformats.org/presentationml/2006/main">
+  <p:cSld>
+    <p:spTree>
+      <p:nvGrpSpPr>
+        <p:cNvPr id="1" name=""/>
+        <p:cNvGrpSpPr/>
+        <p:nvPr/>
+      </p:nvGrpSpPr>
+      <p:grpSpPr>
+        <a:xfrm>
+          <a:off x="0" y="0"/>
+          <a:ext cx="0" cy="0"/>
+          <a:chOff x="0" y="0"/>
+          <a:chExt cx="0" cy="0"/>
+        </a:xfrm>
+      </p:grpSpPr>
+      <p:sp>
+        <p:nvSpPr>
+          <p:cNvPr id="2" name="Title 1">
+            <a:extLst>
+              <a:ext uri="{FF2B5EF4-FFF2-40B4-BE49-F238E27FC236}">
+                <a16:creationId xmlns:a16="http://schemas.microsoft.com/office/drawing/2014/main" id="{3823ED87-AD32-4739-9C5C-208049C1F2A7}"/>
+              </a:ext>
+            </a:extLst>
+          </p:cNvPr>
+          <p:cNvSpPr>
+            <a:spLocks noGrp="1"/>
+          </p:cNvSpPr>
+          <p:nvPr>
+            <p:ph type="ctrTitle"/>
+          </p:nvPr>
+        </p:nvSpPr>
+        <p:spPr>
+          <a:xfrm>
+            <a:off x="1524000" y="491083"/>
+            <a:ext cx="9144000" cy="1008552"/>
+          </a:xfrm>
+        </p:spPr>
+        <p:txBody>
+          <a:bodyPr/>
+          <a:lstStyle/>
+          <a:p>
+            <a:r>
+              <a:rPr lang="en-US" b="1" dirty="0"/>
+              <a:t>Find</a:t>
+            </a:r>
+          </a:p>
+        </p:txBody>
+      </p:sp>
+      <p:pic>
+        <p:nvPicPr>
+          <p:cNvPr id="5" name="Picture 4" descr="A red apple&#10;&#10;Description automatically generated">
+            <a:extLst>
+              <a:ext uri="{FF2B5EF4-FFF2-40B4-BE49-F238E27FC236}">
+                <a16:creationId xmlns:a16="http://schemas.microsoft.com/office/drawing/2014/main" id="{5222F148-B9D0-47FF-A5E3-802700705EC4}"/>
+              </a:ext>
+            </a:extLst>
+          </p:cNvPr>
+          <p:cNvPicPr>
+            <a:picLocks noChangeAspect="1"/>
+          </p:cNvPicPr>
+          <p:nvPr/>
+        </p:nvPicPr>
+        <p:blipFill>
+          <a:blip r:embed="rId2">
+            <a:extLst>
+              <a:ext uri="{28A0092B-C50C-407E-A947-70E740481C1C}">
+                <a14:useLocalDpi xmlns:a14="http://schemas.microsoft.com/office/drawing/2010/main" val="0"/>
+              </a:ext>
+            </a:extLst>
+          </a:blip>
+          <a:stretch>
+            <a:fillRect/>
+          </a:stretch>
+        </p:blipFill>
+        <p:spPr>
+          <a:xfrm>
+            <a:off x="4667250" y="2296709"/>
+            <a:ext cx="2857500" cy="2857500"/>
+          </a:xfrm>
+          <a:prstGeom prst="rect">
+            <a:avLst/>
+          </a:prstGeom>
+        </p:spPr>
+      </p:pic>
+    </p:spTree>
+    <p:extLst>
+      <p:ext uri="{BB962C8B-B14F-4D97-AF65-F5344CB8AC3E}">
+        <p14:creationId xmlns:p14="http://schemas.microsoft.com/office/powerpoint/2010/main" val="3574232862"/>
+      </p:ext>
+    </p:extLst>
+  </p:cSld>
+  <p:clrMapOvr>
+    <a:masterClrMapping/>
+  </p:clrMapOvr>
+</p:sld>
+</file>
+
+<file path=ppt/slides/slide9.xml><?xml version="1.0" encoding="utf-8"?>
+<p:sld xmlns:a="http://schemas.openxmlformats.org/drawingml/2006/main" xmlns:r="http://schemas.openxmlformats.org/officeDocument/2006/relationships" xmlns:p="http://schemas.openxmlformats.org/presentationml/2006/main">
+  <p:cSld>
+    <p:spTree>
+      <p:nvGrpSpPr>
+        <p:cNvPr id="1" name=""/>
+        <p:cNvGrpSpPr/>
+        <p:nvPr/>
+      </p:nvGrpSpPr>
+      <p:grpSpPr>
+        <a:xfrm>
+          <a:off x="0" y="0"/>
+          <a:ext cx="0" cy="0"/>
+          <a:chOff x="0" y="0"/>
+          <a:chExt cx="0" cy="0"/>
+        </a:xfrm>
+      </p:grpSpPr>
+      <p:sp>
+        <p:nvSpPr>
+          <p:cNvPr id="2" name="Title 1">
+            <a:extLst>
+              <a:ext uri="{FF2B5EF4-FFF2-40B4-BE49-F238E27FC236}">
+                <a16:creationId xmlns:a16="http://schemas.microsoft.com/office/drawing/2014/main" id="{3823ED87-AD32-4739-9C5C-208049C1F2A7}"/>
+              </a:ext>
+            </a:extLst>
+          </p:cNvPr>
+          <p:cNvSpPr>
+            <a:spLocks noGrp="1"/>
+          </p:cNvSpPr>
+          <p:nvPr>
+            <p:ph type="ctrTitle"/>
+          </p:nvPr>
+        </p:nvSpPr>
+        <p:spPr>
+          <a:xfrm>
+            <a:off x="1524000" y="491083"/>
+            <a:ext cx="9144000" cy="1008552"/>
+          </a:xfrm>
+        </p:spPr>
+        <p:txBody>
+          <a:bodyPr/>
+          <a:lstStyle/>
+          <a:p>
+            <a:r>
+              <a:rPr lang="en-US" b="1" dirty="0"/>
+              <a:t>Find</a:t>
+            </a:r>
+          </a:p>
+        </p:txBody>
+      </p:sp>
+      <p:pic>
+        <p:nvPicPr>
+          <p:cNvPr id="16" name="Picture 15" descr="A picture containing vase, table, flower, sitting&#10;&#10;Description automatically generated">
+            <a:extLst>
+              <a:ext uri="{FF2B5EF4-FFF2-40B4-BE49-F238E27FC236}">
+                <a16:creationId xmlns:a16="http://schemas.microsoft.com/office/drawing/2014/main" id="{9C142CEE-C2A1-4C69-98C8-24C0348F36CF}"/>
+              </a:ext>
+            </a:extLst>
+          </p:cNvPr>
+          <p:cNvPicPr>
+            <a:picLocks noChangeAspect="1"/>
+          </p:cNvPicPr>
+          <p:nvPr/>
+        </p:nvPicPr>
+        <p:blipFill>
+          <a:blip r:embed="rId2">
+            <a:extLst>
+              <a:ext uri="{28A0092B-C50C-407E-A947-70E740481C1C}">
+                <a14:useLocalDpi xmlns:a14="http://schemas.microsoft.com/office/drawing/2010/main" val="0"/>
+              </a:ext>
+            </a:extLst>
+          </a:blip>
+          <a:stretch>
+            <a:fillRect/>
+          </a:stretch>
+        </p:blipFill>
+        <p:spPr>
+          <a:xfrm>
+            <a:off x="4966713" y="1371596"/>
+            <a:ext cx="2990094" cy="4114808"/>
+          </a:xfrm>
+          <a:prstGeom prst="rect">
+            <a:avLst/>
+          </a:prstGeom>
+        </p:spPr>
+      </p:pic>
+    </p:spTree>
+    <p:extLst>
+      <p:ext uri="{BB962C8B-B14F-4D97-AF65-F5344CB8AC3E}">
+        <p14:creationId xmlns:p14="http://schemas.microsoft.com/office/powerpoint/2010/main" val="1315242420"/>
       </p:ext>
     </p:extLst>
   </p:cSld>

</xml_diff>

<commit_message>
Updated: Unity Version + HUD options + Configuration Template + Buttons + Autorun
Upadtes to incoproate/cleanup new online and HUD options and incorporate them into the Configuration Template.
</commit_message>
<xml_diff>
--- a/Assets/StreamingAssets/2D_Objects/Tutorial_Instructions/~Tutorial Instructions.pptx
+++ b/Assets/StreamingAssets/2D_Objects/Tutorial_Instructions/~Tutorial Instructions.pptx
@@ -6,17 +6,20 @@
   </p:sldMasterIdLst>
   <p:sldIdLst>
     <p:sldId id="256" r:id="rId2"/>
-    <p:sldId id="277" r:id="rId3"/>
-    <p:sldId id="282" r:id="rId4"/>
-    <p:sldId id="273" r:id="rId5"/>
-    <p:sldId id="270" r:id="rId6"/>
-    <p:sldId id="278" r:id="rId7"/>
-    <p:sldId id="276" r:id="rId8"/>
-    <p:sldId id="279" r:id="rId9"/>
-    <p:sldId id="280" r:id="rId10"/>
-    <p:sldId id="281" r:id="rId11"/>
-    <p:sldId id="262" r:id="rId12"/>
-    <p:sldId id="283" r:id="rId13"/>
+    <p:sldId id="285" r:id="rId3"/>
+    <p:sldId id="277" r:id="rId4"/>
+    <p:sldId id="282" r:id="rId5"/>
+    <p:sldId id="284" r:id="rId6"/>
+    <p:sldId id="273" r:id="rId7"/>
+    <p:sldId id="286" r:id="rId8"/>
+    <p:sldId id="270" r:id="rId9"/>
+    <p:sldId id="278" r:id="rId10"/>
+    <p:sldId id="276" r:id="rId11"/>
+    <p:sldId id="279" r:id="rId12"/>
+    <p:sldId id="280" r:id="rId13"/>
+    <p:sldId id="281" r:id="rId14"/>
+    <p:sldId id="262" r:id="rId15"/>
+    <p:sldId id="283" r:id="rId16"/>
   </p:sldIdLst>
   <p:sldSz cx="12192000" cy="6858000"/>
   <p:notesSz cx="6858000" cy="9144000"/>
@@ -270,7 +273,7 @@
           <a:p>
             <a:fld id="{43D9F887-C526-42E2-BE1C-7F1C55940A26}" type="datetimeFigureOut">
               <a:rPr lang="en-US" smtClean="0"/>
-              <a:t>2/3/2020</a:t>
+              <a:t>7/21/2020</a:t>
             </a:fld>
             <a:endParaRPr lang="en-US"/>
           </a:p>
@@ -468,7 +471,7 @@
           <a:p>
             <a:fld id="{43D9F887-C526-42E2-BE1C-7F1C55940A26}" type="datetimeFigureOut">
               <a:rPr lang="en-US" smtClean="0"/>
-              <a:t>2/3/2020</a:t>
+              <a:t>7/21/2020</a:t>
             </a:fld>
             <a:endParaRPr lang="en-US"/>
           </a:p>
@@ -676,7 +679,7 @@
           <a:p>
             <a:fld id="{43D9F887-C526-42E2-BE1C-7F1C55940A26}" type="datetimeFigureOut">
               <a:rPr lang="en-US" smtClean="0"/>
-              <a:t>2/3/2020</a:t>
+              <a:t>7/21/2020</a:t>
             </a:fld>
             <a:endParaRPr lang="en-US"/>
           </a:p>
@@ -874,7 +877,7 @@
           <a:p>
             <a:fld id="{43D9F887-C526-42E2-BE1C-7F1C55940A26}" type="datetimeFigureOut">
               <a:rPr lang="en-US" smtClean="0"/>
-              <a:t>2/3/2020</a:t>
+              <a:t>7/21/2020</a:t>
             </a:fld>
             <a:endParaRPr lang="en-US"/>
           </a:p>
@@ -1149,7 +1152,7 @@
           <a:p>
             <a:fld id="{43D9F887-C526-42E2-BE1C-7F1C55940A26}" type="datetimeFigureOut">
               <a:rPr lang="en-US" smtClean="0"/>
-              <a:t>2/3/2020</a:t>
+              <a:t>7/21/2020</a:t>
             </a:fld>
             <a:endParaRPr lang="en-US"/>
           </a:p>
@@ -1414,7 +1417,7 @@
           <a:p>
             <a:fld id="{43D9F887-C526-42E2-BE1C-7F1C55940A26}" type="datetimeFigureOut">
               <a:rPr lang="en-US" smtClean="0"/>
-              <a:t>2/3/2020</a:t>
+              <a:t>7/21/2020</a:t>
             </a:fld>
             <a:endParaRPr lang="en-US"/>
           </a:p>
@@ -1826,7 +1829,7 @@
           <a:p>
             <a:fld id="{43D9F887-C526-42E2-BE1C-7F1C55940A26}" type="datetimeFigureOut">
               <a:rPr lang="en-US" smtClean="0"/>
-              <a:t>2/3/2020</a:t>
+              <a:t>7/21/2020</a:t>
             </a:fld>
             <a:endParaRPr lang="en-US"/>
           </a:p>
@@ -1967,7 +1970,7 @@
           <a:p>
             <a:fld id="{43D9F887-C526-42E2-BE1C-7F1C55940A26}" type="datetimeFigureOut">
               <a:rPr lang="en-US" smtClean="0"/>
-              <a:t>2/3/2020</a:t>
+              <a:t>7/21/2020</a:t>
             </a:fld>
             <a:endParaRPr lang="en-US"/>
           </a:p>
@@ -2080,7 +2083,7 @@
           <a:p>
             <a:fld id="{43D9F887-C526-42E2-BE1C-7F1C55940A26}" type="datetimeFigureOut">
               <a:rPr lang="en-US" smtClean="0"/>
-              <a:t>2/3/2020</a:t>
+              <a:t>7/21/2020</a:t>
             </a:fld>
             <a:endParaRPr lang="en-US"/>
           </a:p>
@@ -2391,7 +2394,7 @@
           <a:p>
             <a:fld id="{43D9F887-C526-42E2-BE1C-7F1C55940A26}" type="datetimeFigureOut">
               <a:rPr lang="en-US" smtClean="0"/>
-              <a:t>2/3/2020</a:t>
+              <a:t>7/21/2020</a:t>
             </a:fld>
             <a:endParaRPr lang="en-US"/>
           </a:p>
@@ -2679,7 +2682,7 @@
           <a:p>
             <a:fld id="{43D9F887-C526-42E2-BE1C-7F1C55940A26}" type="datetimeFigureOut">
               <a:rPr lang="en-US" smtClean="0"/>
-              <a:t>2/3/2020</a:t>
+              <a:t>7/21/2020</a:t>
             </a:fld>
             <a:endParaRPr lang="en-US"/>
           </a:p>
@@ -2920,7 +2923,7 @@
           <a:p>
             <a:fld id="{43D9F887-C526-42E2-BE1C-7F1C55940A26}" type="datetimeFigureOut">
               <a:rPr lang="en-US" smtClean="0"/>
-              <a:t>2/3/2020</a:t>
+              <a:t>7/21/2020</a:t>
             </a:fld>
             <a:endParaRPr lang="en-US"/>
           </a:p>
@@ -3466,6 +3469,396 @@
           <a:p>
             <a:r>
               <a:rPr lang="en-US" b="1" dirty="0"/>
+              <a:t>Collect the Items!</a:t>
+            </a:r>
+          </a:p>
+        </p:txBody>
+      </p:sp>
+      <p:grpSp>
+        <p:nvGrpSpPr>
+          <p:cNvPr id="17" name="Group 16">
+            <a:extLst>
+              <a:ext uri="{FF2B5EF4-FFF2-40B4-BE49-F238E27FC236}">
+                <a16:creationId xmlns:a16="http://schemas.microsoft.com/office/drawing/2014/main" id="{8A995936-5E47-4957-902C-A07C271D5CFF}"/>
+              </a:ext>
+            </a:extLst>
+          </p:cNvPr>
+          <p:cNvGrpSpPr/>
+          <p:nvPr/>
+        </p:nvGrpSpPr>
+        <p:grpSpPr>
+          <a:xfrm>
+            <a:off x="286429" y="2149264"/>
+            <a:ext cx="11619142" cy="4525002"/>
+            <a:chOff x="163616" y="2149264"/>
+            <a:chExt cx="11619142" cy="4525002"/>
+          </a:xfrm>
+        </p:grpSpPr>
+        <p:pic>
+          <p:nvPicPr>
+            <p:cNvPr id="5" name="Picture 4" descr="A red apple&#10;&#10;Description automatically generated">
+              <a:extLst>
+                <a:ext uri="{FF2B5EF4-FFF2-40B4-BE49-F238E27FC236}">
+                  <a16:creationId xmlns:a16="http://schemas.microsoft.com/office/drawing/2014/main" id="{5222F148-B9D0-47FF-A5E3-802700705EC4}"/>
+                </a:ext>
+              </a:extLst>
+            </p:cNvPr>
+            <p:cNvPicPr>
+              <a:picLocks noChangeAspect="1"/>
+            </p:cNvPicPr>
+            <p:nvPr/>
+          </p:nvPicPr>
+          <p:blipFill>
+            <a:blip r:embed="rId2">
+              <a:extLst>
+                <a:ext uri="{28A0092B-C50C-407E-A947-70E740481C1C}">
+                  <a14:useLocalDpi xmlns:a14="http://schemas.microsoft.com/office/drawing/2010/main" val="0"/>
+                </a:ext>
+              </a:extLst>
+            </a:blip>
+            <a:stretch>
+              <a:fillRect/>
+            </a:stretch>
+          </p:blipFill>
+          <p:spPr>
+            <a:xfrm>
+              <a:off x="163616" y="3254842"/>
+              <a:ext cx="2857500" cy="2857500"/>
+            </a:xfrm>
+            <a:prstGeom prst="rect">
+              <a:avLst/>
+            </a:prstGeom>
+          </p:spPr>
+        </p:pic>
+        <p:pic>
+          <p:nvPicPr>
+            <p:cNvPr id="14" name="Picture 13" descr="A picture containing sitting, laying&#10;&#10;Description automatically generated">
+              <a:extLst>
+                <a:ext uri="{FF2B5EF4-FFF2-40B4-BE49-F238E27FC236}">
+                  <a16:creationId xmlns:a16="http://schemas.microsoft.com/office/drawing/2014/main" id="{125EED36-0B92-46E5-AA24-EE9E62244456}"/>
+                </a:ext>
+              </a:extLst>
+            </p:cNvPr>
+            <p:cNvPicPr>
+              <a:picLocks noChangeAspect="1"/>
+            </p:cNvPicPr>
+            <p:nvPr/>
+          </p:nvPicPr>
+          <p:blipFill>
+            <a:blip r:embed="rId3">
+              <a:extLst>
+                <a:ext uri="{28A0092B-C50C-407E-A947-70E740481C1C}">
+                  <a14:useLocalDpi xmlns:a14="http://schemas.microsoft.com/office/drawing/2010/main" val="0"/>
+                </a:ext>
+              </a:extLst>
+            </a:blip>
+            <a:stretch>
+              <a:fillRect/>
+            </a:stretch>
+          </p:blipFill>
+          <p:spPr>
+            <a:xfrm>
+              <a:off x="3820913" y="2581578"/>
+              <a:ext cx="4171955" cy="4092688"/>
+            </a:xfrm>
+            <a:prstGeom prst="rect">
+              <a:avLst/>
+            </a:prstGeom>
+          </p:spPr>
+        </p:pic>
+        <p:pic>
+          <p:nvPicPr>
+            <p:cNvPr id="16" name="Picture 15" descr="A picture containing vase, table, flower, sitting&#10;&#10;Description automatically generated">
+              <a:extLst>
+                <a:ext uri="{FF2B5EF4-FFF2-40B4-BE49-F238E27FC236}">
+                  <a16:creationId xmlns:a16="http://schemas.microsoft.com/office/drawing/2014/main" id="{9C142CEE-C2A1-4C69-98C8-24C0348F36CF}"/>
+                </a:ext>
+              </a:extLst>
+            </p:cNvPr>
+            <p:cNvPicPr>
+              <a:picLocks noChangeAspect="1"/>
+            </p:cNvPicPr>
+            <p:nvPr/>
+          </p:nvPicPr>
+          <p:blipFill>
+            <a:blip r:embed="rId4">
+              <a:extLst>
+                <a:ext uri="{28A0092B-C50C-407E-A947-70E740481C1C}">
+                  <a14:useLocalDpi xmlns:a14="http://schemas.microsoft.com/office/drawing/2010/main" val="0"/>
+                </a:ext>
+              </a:extLst>
+            </a:blip>
+            <a:stretch>
+              <a:fillRect/>
+            </a:stretch>
+          </p:blipFill>
+          <p:spPr>
+            <a:xfrm>
+              <a:off x="8792664" y="2149264"/>
+              <a:ext cx="2990094" cy="4114808"/>
+            </a:xfrm>
+            <a:prstGeom prst="rect">
+              <a:avLst/>
+            </a:prstGeom>
+          </p:spPr>
+        </p:pic>
+      </p:grpSp>
+    </p:spTree>
+    <p:extLst>
+      <p:ext uri="{BB962C8B-B14F-4D97-AF65-F5344CB8AC3E}">
+        <p14:creationId xmlns:p14="http://schemas.microsoft.com/office/powerpoint/2010/main" val="4023285758"/>
+      </p:ext>
+    </p:extLst>
+  </p:cSld>
+  <p:clrMapOvr>
+    <a:masterClrMapping/>
+  </p:clrMapOvr>
+</p:sld>
+</file>
+
+<file path=ppt/slides/slide11.xml><?xml version="1.0" encoding="utf-8"?>
+<p:sld xmlns:a="http://schemas.openxmlformats.org/drawingml/2006/main" xmlns:r="http://schemas.openxmlformats.org/officeDocument/2006/relationships" xmlns:p="http://schemas.openxmlformats.org/presentationml/2006/main">
+  <p:cSld>
+    <p:spTree>
+      <p:nvGrpSpPr>
+        <p:cNvPr id="1" name=""/>
+        <p:cNvGrpSpPr/>
+        <p:nvPr/>
+      </p:nvGrpSpPr>
+      <p:grpSpPr>
+        <a:xfrm>
+          <a:off x="0" y="0"/>
+          <a:ext cx="0" cy="0"/>
+          <a:chOff x="0" y="0"/>
+          <a:chExt cx="0" cy="0"/>
+        </a:xfrm>
+      </p:grpSpPr>
+      <p:sp>
+        <p:nvSpPr>
+          <p:cNvPr id="2" name="Title 1">
+            <a:extLst>
+              <a:ext uri="{FF2B5EF4-FFF2-40B4-BE49-F238E27FC236}">
+                <a16:creationId xmlns:a16="http://schemas.microsoft.com/office/drawing/2014/main" id="{3823ED87-AD32-4739-9C5C-208049C1F2A7}"/>
+              </a:ext>
+            </a:extLst>
+          </p:cNvPr>
+          <p:cNvSpPr>
+            <a:spLocks noGrp="1"/>
+          </p:cNvSpPr>
+          <p:nvPr>
+            <p:ph type="ctrTitle"/>
+          </p:nvPr>
+        </p:nvSpPr>
+        <p:spPr>
+          <a:xfrm>
+            <a:off x="1523999" y="220738"/>
+            <a:ext cx="9144000" cy="1008552"/>
+          </a:xfrm>
+        </p:spPr>
+        <p:txBody>
+          <a:bodyPr/>
+          <a:lstStyle/>
+          <a:p>
+            <a:r>
+              <a:rPr lang="en-US" b="1" dirty="0"/>
+              <a:t>Find</a:t>
+            </a:r>
+          </a:p>
+        </p:txBody>
+      </p:sp>
+      <p:pic>
+        <p:nvPicPr>
+          <p:cNvPr id="14" name="Picture 13" descr="A picture containing sitting, laying&#10;&#10;Description automatically generated">
+            <a:extLst>
+              <a:ext uri="{FF2B5EF4-FFF2-40B4-BE49-F238E27FC236}">
+                <a16:creationId xmlns:a16="http://schemas.microsoft.com/office/drawing/2014/main" id="{125EED36-0B92-46E5-AA24-EE9E62244456}"/>
+              </a:ext>
+            </a:extLst>
+          </p:cNvPr>
+          <p:cNvPicPr>
+            <a:picLocks noChangeAspect="1"/>
+          </p:cNvPicPr>
+          <p:nvPr/>
+        </p:nvPicPr>
+        <p:blipFill>
+          <a:blip r:embed="rId2">
+            <a:extLst>
+              <a:ext uri="{28A0092B-C50C-407E-A947-70E740481C1C}">
+                <a14:useLocalDpi xmlns:a14="http://schemas.microsoft.com/office/drawing/2010/main" val="0"/>
+              </a:ext>
+            </a:extLst>
+          </a:blip>
+          <a:stretch>
+            <a:fillRect/>
+          </a:stretch>
+        </p:blipFill>
+        <p:spPr>
+          <a:xfrm>
+            <a:off x="4010022" y="1382656"/>
+            <a:ext cx="4171955" cy="4092688"/>
+          </a:xfrm>
+          <a:prstGeom prst="rect">
+            <a:avLst/>
+          </a:prstGeom>
+        </p:spPr>
+      </p:pic>
+    </p:spTree>
+    <p:extLst>
+      <p:ext uri="{BB962C8B-B14F-4D97-AF65-F5344CB8AC3E}">
+        <p14:creationId xmlns:p14="http://schemas.microsoft.com/office/powerpoint/2010/main" val="3679336169"/>
+      </p:ext>
+    </p:extLst>
+  </p:cSld>
+  <p:clrMapOvr>
+    <a:masterClrMapping/>
+  </p:clrMapOvr>
+</p:sld>
+</file>
+
+<file path=ppt/slides/slide12.xml><?xml version="1.0" encoding="utf-8"?>
+<p:sld xmlns:a="http://schemas.openxmlformats.org/drawingml/2006/main" xmlns:r="http://schemas.openxmlformats.org/officeDocument/2006/relationships" xmlns:p="http://schemas.openxmlformats.org/presentationml/2006/main">
+  <p:cSld>
+    <p:spTree>
+      <p:nvGrpSpPr>
+        <p:cNvPr id="1" name=""/>
+        <p:cNvGrpSpPr/>
+        <p:nvPr/>
+      </p:nvGrpSpPr>
+      <p:grpSpPr>
+        <a:xfrm>
+          <a:off x="0" y="0"/>
+          <a:ext cx="0" cy="0"/>
+          <a:chOff x="0" y="0"/>
+          <a:chExt cx="0" cy="0"/>
+        </a:xfrm>
+      </p:grpSpPr>
+      <p:sp>
+        <p:nvSpPr>
+          <p:cNvPr id="2" name="Title 1">
+            <a:extLst>
+              <a:ext uri="{FF2B5EF4-FFF2-40B4-BE49-F238E27FC236}">
+                <a16:creationId xmlns:a16="http://schemas.microsoft.com/office/drawing/2014/main" id="{3823ED87-AD32-4739-9C5C-208049C1F2A7}"/>
+              </a:ext>
+            </a:extLst>
+          </p:cNvPr>
+          <p:cNvSpPr>
+            <a:spLocks noGrp="1"/>
+          </p:cNvSpPr>
+          <p:nvPr>
+            <p:ph type="ctrTitle"/>
+          </p:nvPr>
+        </p:nvSpPr>
+        <p:spPr>
+          <a:xfrm>
+            <a:off x="1524000" y="491083"/>
+            <a:ext cx="9144000" cy="1008552"/>
+          </a:xfrm>
+        </p:spPr>
+        <p:txBody>
+          <a:bodyPr/>
+          <a:lstStyle/>
+          <a:p>
+            <a:r>
+              <a:rPr lang="en-US" b="1" dirty="0"/>
+              <a:t>Find</a:t>
+            </a:r>
+          </a:p>
+        </p:txBody>
+      </p:sp>
+      <p:pic>
+        <p:nvPicPr>
+          <p:cNvPr id="5" name="Picture 4" descr="A red apple&#10;&#10;Description automatically generated">
+            <a:extLst>
+              <a:ext uri="{FF2B5EF4-FFF2-40B4-BE49-F238E27FC236}">
+                <a16:creationId xmlns:a16="http://schemas.microsoft.com/office/drawing/2014/main" id="{5222F148-B9D0-47FF-A5E3-802700705EC4}"/>
+              </a:ext>
+            </a:extLst>
+          </p:cNvPr>
+          <p:cNvPicPr>
+            <a:picLocks noChangeAspect="1"/>
+          </p:cNvPicPr>
+          <p:nvPr/>
+        </p:nvPicPr>
+        <p:blipFill>
+          <a:blip r:embed="rId2">
+            <a:extLst>
+              <a:ext uri="{28A0092B-C50C-407E-A947-70E740481C1C}">
+                <a14:useLocalDpi xmlns:a14="http://schemas.microsoft.com/office/drawing/2010/main" val="0"/>
+              </a:ext>
+            </a:extLst>
+          </a:blip>
+          <a:stretch>
+            <a:fillRect/>
+          </a:stretch>
+        </p:blipFill>
+        <p:spPr>
+          <a:xfrm>
+            <a:off x="4667250" y="2296709"/>
+            <a:ext cx="2857500" cy="2857500"/>
+          </a:xfrm>
+          <a:prstGeom prst="rect">
+            <a:avLst/>
+          </a:prstGeom>
+        </p:spPr>
+      </p:pic>
+    </p:spTree>
+    <p:extLst>
+      <p:ext uri="{BB962C8B-B14F-4D97-AF65-F5344CB8AC3E}">
+        <p14:creationId xmlns:p14="http://schemas.microsoft.com/office/powerpoint/2010/main" val="3574232862"/>
+      </p:ext>
+    </p:extLst>
+  </p:cSld>
+  <p:clrMapOvr>
+    <a:masterClrMapping/>
+  </p:clrMapOvr>
+</p:sld>
+</file>
+
+<file path=ppt/slides/slide13.xml><?xml version="1.0" encoding="utf-8"?>
+<p:sld xmlns:a="http://schemas.openxmlformats.org/drawingml/2006/main" xmlns:r="http://schemas.openxmlformats.org/officeDocument/2006/relationships" xmlns:p="http://schemas.openxmlformats.org/presentationml/2006/main">
+  <p:cSld>
+    <p:spTree>
+      <p:nvGrpSpPr>
+        <p:cNvPr id="1" name=""/>
+        <p:cNvGrpSpPr/>
+        <p:nvPr/>
+      </p:nvGrpSpPr>
+      <p:grpSpPr>
+        <a:xfrm>
+          <a:off x="0" y="0"/>
+          <a:ext cx="0" cy="0"/>
+          <a:chOff x="0" y="0"/>
+          <a:chExt cx="0" cy="0"/>
+        </a:xfrm>
+      </p:grpSpPr>
+      <p:sp>
+        <p:nvSpPr>
+          <p:cNvPr id="2" name="Title 1">
+            <a:extLst>
+              <a:ext uri="{FF2B5EF4-FFF2-40B4-BE49-F238E27FC236}">
+                <a16:creationId xmlns:a16="http://schemas.microsoft.com/office/drawing/2014/main" id="{3823ED87-AD32-4739-9C5C-208049C1F2A7}"/>
+              </a:ext>
+            </a:extLst>
+          </p:cNvPr>
+          <p:cNvSpPr>
+            <a:spLocks noGrp="1"/>
+          </p:cNvSpPr>
+          <p:nvPr>
+            <p:ph type="ctrTitle"/>
+          </p:nvPr>
+        </p:nvSpPr>
+        <p:spPr>
+          <a:xfrm>
+            <a:off x="1524000" y="491083"/>
+            <a:ext cx="9144000" cy="1008552"/>
+          </a:xfrm>
+        </p:spPr>
+        <p:txBody>
+          <a:bodyPr/>
+          <a:lstStyle/>
+          <a:p>
+            <a:r>
+              <a:rPr lang="en-US" b="1" dirty="0"/>
               <a:t>Find</a:t>
             </a:r>
           </a:p>
@@ -3520,7 +3913,7 @@
 </p:sld>
 </file>
 
-<file path=ppt/slides/slide11.xml><?xml version="1.0" encoding="utf-8"?>
+<file path=ppt/slides/slide14.xml><?xml version="1.0" encoding="utf-8"?>
 <p:sld xmlns:a="http://schemas.openxmlformats.org/drawingml/2006/main" xmlns:r="http://schemas.openxmlformats.org/officeDocument/2006/relationships" xmlns:p="http://schemas.openxmlformats.org/presentationml/2006/main">
   <p:cSld>
     <p:spTree>
@@ -3555,8 +3948,8 @@
         </p:nvSpPr>
         <p:spPr>
           <a:xfrm>
-            <a:off x="838200" y="1960306"/>
-            <a:ext cx="10515600" cy="2343056"/>
+            <a:off x="0" y="383690"/>
+            <a:ext cx="12192000" cy="4931775"/>
           </a:xfrm>
         </p:spPr>
         <p:txBody>
@@ -3568,7 +3961,7 @@
             <a:pPr algn="ctr"/>
             <a:r>
               <a:rPr lang="en-US" b="1" dirty="0"/>
-              <a:t>Great Work!</a:t>
+              <a:t>You’ve Completed the Experiment!</a:t>
             </a:r>
             <a:br>
               <a:rPr lang="en-US" dirty="0"/>
@@ -3577,12 +3970,158 @@
               <a:rPr lang="en-US" dirty="0"/>
             </a:br>
             <a:r>
-              <a:rPr lang="en-US" dirty="0"/>
-              <a:t>You’ve completed the experiment!</a:t>
-            </a:r>
-          </a:p>
-        </p:txBody>
-      </p:sp>
+              <a:rPr lang="en-US" sz="3600" dirty="0"/>
+              <a:t>Note: The </a:t>
+            </a:r>
+            <a:r>
+              <a:rPr lang="en-US" sz="3600" b="1" dirty="0"/>
+              <a:t>End Experiment </a:t>
+            </a:r>
+            <a:r>
+              <a:rPr lang="en-US" sz="3600" dirty="0"/>
+              <a:t>button will not end the experiment if you’re running it in the Unity Editor. </a:t>
+            </a:r>
+            <a:br>
+              <a:rPr lang="en-US" sz="3600" dirty="0"/>
+            </a:br>
+            <a:br>
+              <a:rPr lang="en-US" sz="3600" dirty="0"/>
+            </a:br>
+            <a:r>
+              <a:rPr lang="en-US" sz="3600" dirty="0"/>
+              <a:t>Press the        button at the top of the editor to end the experiment. </a:t>
+            </a:r>
+            <a:endParaRPr lang="en-US" dirty="0"/>
+          </a:p>
+        </p:txBody>
+      </p:sp>
+      <p:grpSp>
+        <p:nvGrpSpPr>
+          <p:cNvPr id="6" name="Group 5">
+            <a:extLst>
+              <a:ext uri="{FF2B5EF4-FFF2-40B4-BE49-F238E27FC236}">
+                <a16:creationId xmlns:a16="http://schemas.microsoft.com/office/drawing/2014/main" id="{291EFAC3-4199-435E-8BCB-D4408933085A}"/>
+              </a:ext>
+            </a:extLst>
+          </p:cNvPr>
+          <p:cNvGrpSpPr/>
+          <p:nvPr/>
+        </p:nvGrpSpPr>
+        <p:grpSpPr>
+          <a:xfrm>
+            <a:off x="2837937" y="3639066"/>
+            <a:ext cx="634313" cy="634313"/>
+            <a:chOff x="5778844" y="3111844"/>
+            <a:chExt cx="634313" cy="634313"/>
+          </a:xfrm>
+        </p:grpSpPr>
+        <p:sp>
+          <p:nvSpPr>
+            <p:cNvPr id="3" name="Rectangle: Rounded Corners 2">
+              <a:extLst>
+                <a:ext uri="{FF2B5EF4-FFF2-40B4-BE49-F238E27FC236}">
+                  <a16:creationId xmlns:a16="http://schemas.microsoft.com/office/drawing/2014/main" id="{46523303-FF10-4F77-A871-98D27DD08309}"/>
+                </a:ext>
+              </a:extLst>
+            </p:cNvPr>
+            <p:cNvSpPr/>
+            <p:nvPr/>
+          </p:nvSpPr>
+          <p:spPr>
+            <a:xfrm>
+              <a:off x="5778844" y="3111844"/>
+              <a:ext cx="634313" cy="634313"/>
+            </a:xfrm>
+            <a:prstGeom prst="roundRect">
+              <a:avLst/>
+            </a:prstGeom>
+            <a:solidFill>
+              <a:schemeClr val="accent3">
+                <a:lumMod val="40000"/>
+                <a:lumOff val="60000"/>
+              </a:schemeClr>
+            </a:solidFill>
+          </p:spPr>
+          <p:style>
+            <a:lnRef idx="2">
+              <a:schemeClr val="accent3">
+                <a:shade val="50000"/>
+              </a:schemeClr>
+            </a:lnRef>
+            <a:fillRef idx="1">
+              <a:schemeClr val="accent3"/>
+            </a:fillRef>
+            <a:effectRef idx="0">
+              <a:schemeClr val="accent3"/>
+            </a:effectRef>
+            <a:fontRef idx="minor">
+              <a:schemeClr val="lt1"/>
+            </a:fontRef>
+          </p:style>
+          <p:txBody>
+            <a:bodyPr rtlCol="0" anchor="ctr"/>
+            <a:lstStyle/>
+            <a:p>
+              <a:pPr algn="ctr"/>
+              <a:endParaRPr lang="en-US"/>
+            </a:p>
+          </p:txBody>
+        </p:sp>
+        <p:sp>
+          <p:nvSpPr>
+            <p:cNvPr id="5" name="Isosceles Triangle 4">
+              <a:extLst>
+                <a:ext uri="{FF2B5EF4-FFF2-40B4-BE49-F238E27FC236}">
+                  <a16:creationId xmlns:a16="http://schemas.microsoft.com/office/drawing/2014/main" id="{CFD63078-773B-4F8A-8C2F-70304AE61662}"/>
+                </a:ext>
+              </a:extLst>
+            </p:cNvPr>
+            <p:cNvSpPr/>
+            <p:nvPr/>
+          </p:nvSpPr>
+          <p:spPr>
+            <a:xfrm rot="5400000">
+              <a:off x="5948649" y="3301973"/>
+              <a:ext cx="294703" cy="254054"/>
+            </a:xfrm>
+            <a:prstGeom prst="triangle">
+              <a:avLst/>
+            </a:prstGeom>
+            <a:solidFill>
+              <a:schemeClr val="bg2">
+                <a:lumMod val="50000"/>
+              </a:schemeClr>
+            </a:solidFill>
+            <a:ln>
+              <a:noFill/>
+            </a:ln>
+          </p:spPr>
+          <p:style>
+            <a:lnRef idx="2">
+              <a:schemeClr val="dk1">
+                <a:shade val="50000"/>
+              </a:schemeClr>
+            </a:lnRef>
+            <a:fillRef idx="1">
+              <a:schemeClr val="dk1"/>
+            </a:fillRef>
+            <a:effectRef idx="0">
+              <a:schemeClr val="dk1"/>
+            </a:effectRef>
+            <a:fontRef idx="minor">
+              <a:schemeClr val="lt1"/>
+            </a:fontRef>
+          </p:style>
+          <p:txBody>
+            <a:bodyPr rtlCol="0" anchor="ctr"/>
+            <a:lstStyle/>
+            <a:p>
+              <a:pPr algn="ctr"/>
+              <a:endParaRPr lang="en-US"/>
+            </a:p>
+          </p:txBody>
+        </p:sp>
+      </p:grpSp>
     </p:spTree>
     <p:extLst>
       <p:ext uri="{BB962C8B-B14F-4D97-AF65-F5344CB8AC3E}">
@@ -3596,7 +4135,7 @@
 </p:sld>
 </file>
 
-<file path=ppt/slides/slide12.xml><?xml version="1.0" encoding="utf-8"?>
+<file path=ppt/slides/slide15.xml><?xml version="1.0" encoding="utf-8"?>
 <p:sld xmlns:a="http://schemas.openxmlformats.org/drawingml/2006/main" xmlns:r="http://schemas.openxmlformats.org/officeDocument/2006/relationships" xmlns:p="http://schemas.openxmlformats.org/presentationml/2006/main">
   <p:cSld>
     <p:spTree>
@@ -3670,6 +4209,176 @@
 </file>
 
 <file path=ppt/slides/slide2.xml><?xml version="1.0" encoding="utf-8"?>
+<p:sld xmlns:a="http://schemas.openxmlformats.org/drawingml/2006/main" xmlns:r="http://schemas.openxmlformats.org/officeDocument/2006/relationships" xmlns:p="http://schemas.openxmlformats.org/presentationml/2006/main">
+  <p:cSld>
+    <p:spTree>
+      <p:nvGrpSpPr>
+        <p:cNvPr id="1" name=""/>
+        <p:cNvGrpSpPr/>
+        <p:nvPr/>
+      </p:nvGrpSpPr>
+      <p:grpSpPr>
+        <a:xfrm>
+          <a:off x="0" y="0"/>
+          <a:ext cx="0" cy="0"/>
+          <a:chOff x="0" y="0"/>
+          <a:chExt cx="0" cy="0"/>
+        </a:xfrm>
+      </p:grpSpPr>
+      <p:sp>
+        <p:nvSpPr>
+          <p:cNvPr id="2" name="Title 1">
+            <a:extLst>
+              <a:ext uri="{FF2B5EF4-FFF2-40B4-BE49-F238E27FC236}">
+                <a16:creationId xmlns:a16="http://schemas.microsoft.com/office/drawing/2014/main" id="{3823ED87-AD32-4739-9C5C-208049C1F2A7}"/>
+              </a:ext>
+            </a:extLst>
+          </p:cNvPr>
+          <p:cNvSpPr>
+            <a:spLocks noGrp="1"/>
+          </p:cNvSpPr>
+          <p:nvPr>
+            <p:ph type="ctrTitle"/>
+          </p:nvPr>
+        </p:nvSpPr>
+        <p:spPr>
+          <a:xfrm>
+            <a:off x="988965" y="747269"/>
+            <a:ext cx="10214070" cy="1008552"/>
+          </a:xfrm>
+        </p:spPr>
+        <p:txBody>
+          <a:bodyPr>
+            <a:normAutofit/>
+          </a:bodyPr>
+          <a:lstStyle/>
+          <a:p>
+            <a:r>
+              <a:rPr lang="en-US" b="1" dirty="0"/>
+              <a:t>Welcome!</a:t>
+            </a:r>
+          </a:p>
+        </p:txBody>
+      </p:sp>
+      <p:pic>
+        <p:nvPicPr>
+          <p:cNvPr id="16" name="Picture 15" descr="A picture containing object, clock&#10;&#10;Description automatically generated">
+            <a:extLst>
+              <a:ext uri="{FF2B5EF4-FFF2-40B4-BE49-F238E27FC236}">
+                <a16:creationId xmlns:a16="http://schemas.microsoft.com/office/drawing/2014/main" id="{967EBCEF-1733-451B-8A52-366F679680DB}"/>
+              </a:ext>
+            </a:extLst>
+          </p:cNvPr>
+          <p:cNvPicPr>
+            <a:picLocks noChangeAspect="1"/>
+          </p:cNvPicPr>
+          <p:nvPr/>
+        </p:nvPicPr>
+        <p:blipFill>
+          <a:blip r:embed="rId2">
+            <a:extLst>
+              <a:ext uri="{28A0092B-C50C-407E-A947-70E740481C1C}">
+                <a14:useLocalDpi xmlns:a14="http://schemas.microsoft.com/office/drawing/2010/main" val="0"/>
+              </a:ext>
+            </a:extLst>
+          </a:blip>
+          <a:stretch>
+            <a:fillRect/>
+          </a:stretch>
+        </p:blipFill>
+        <p:spPr>
+          <a:xfrm>
+            <a:off x="2116298" y="2323527"/>
+            <a:ext cx="7959403" cy="2210945"/>
+          </a:xfrm>
+          <a:prstGeom prst="rect">
+            <a:avLst/>
+          </a:prstGeom>
+        </p:spPr>
+      </p:pic>
+      <p:sp>
+        <p:nvSpPr>
+          <p:cNvPr id="3" name="Rectangle: Rounded Corners 2">
+            <a:extLst>
+              <a:ext uri="{FF2B5EF4-FFF2-40B4-BE49-F238E27FC236}">
+                <a16:creationId xmlns:a16="http://schemas.microsoft.com/office/drawing/2014/main" id="{4C654098-123B-4DB7-9598-E4A644FF056C}"/>
+              </a:ext>
+            </a:extLst>
+          </p:cNvPr>
+          <p:cNvSpPr/>
+          <p:nvPr/>
+        </p:nvSpPr>
+        <p:spPr>
+          <a:xfrm>
+            <a:off x="3244198" y="5567680"/>
+            <a:ext cx="5703604" cy="934720"/>
+          </a:xfrm>
+          <a:prstGeom prst="roundRect">
+            <a:avLst/>
+          </a:prstGeom>
+          <a:solidFill>
+            <a:schemeClr val="bg1"/>
+          </a:solidFill>
+          <a:ln w="76200">
+            <a:solidFill>
+              <a:schemeClr val="tx1"/>
+            </a:solidFill>
+          </a:ln>
+        </p:spPr>
+        <p:style>
+          <a:lnRef idx="2">
+            <a:schemeClr val="accent1">
+              <a:shade val="50000"/>
+            </a:schemeClr>
+          </a:lnRef>
+          <a:fillRef idx="1">
+            <a:schemeClr val="accent1"/>
+          </a:fillRef>
+          <a:effectRef idx="0">
+            <a:schemeClr val="accent1"/>
+          </a:effectRef>
+          <a:fontRef idx="minor">
+            <a:schemeClr val="lt1"/>
+          </a:fontRef>
+        </p:style>
+        <p:txBody>
+          <a:bodyPr rtlCol="0" anchor="ctr"/>
+          <a:lstStyle/>
+          <a:p>
+            <a:pPr algn="ctr"/>
+            <a:r>
+              <a:rPr lang="en-US" sz="2800" dirty="0">
+                <a:ln w="0"/>
+                <a:solidFill>
+                  <a:schemeClr val="tx1"/>
+                </a:solidFill>
+                <a:effectLst>
+                  <a:outerShdw blurRad="38100" dist="19050" dir="2700000" algn="tl" rotWithShape="0">
+                    <a:schemeClr val="dk1">
+                      <a:alpha val="40000"/>
+                    </a:schemeClr>
+                  </a:outerShdw>
+                </a:effectLst>
+              </a:rPr>
+              <a:t>PRESS THE SPACEBAR TO CONITUE</a:t>
+            </a:r>
+          </a:p>
+        </p:txBody>
+      </p:sp>
+    </p:spTree>
+    <p:extLst>
+      <p:ext uri="{BB962C8B-B14F-4D97-AF65-F5344CB8AC3E}">
+        <p14:creationId xmlns:p14="http://schemas.microsoft.com/office/powerpoint/2010/main" val="506068390"/>
+      </p:ext>
+    </p:extLst>
+  </p:cSld>
+  <p:clrMapOvr>
+    <a:masterClrMapping/>
+  </p:clrMapOvr>
+</p:sld>
+</file>
+
+<file path=ppt/slides/slide3.xml><?xml version="1.0" encoding="utf-8"?>
 <p:sld xmlns:a="http://schemas.openxmlformats.org/drawingml/2006/main" xmlns:r="http://schemas.openxmlformats.org/officeDocument/2006/relationships" xmlns:p="http://schemas.openxmlformats.org/presentationml/2006/main">
   <p:cSld>
     <p:spTree>
@@ -4172,7 +4881,7 @@
 </p:sld>
 </file>
 
-<file path=ppt/slides/slide3.xml><?xml version="1.0" encoding="utf-8"?>
+<file path=ppt/slides/slide4.xml><?xml version="1.0" encoding="utf-8"?>
 <p:sld xmlns:a="http://schemas.openxmlformats.org/drawingml/2006/main" xmlns:r="http://schemas.openxmlformats.org/officeDocument/2006/relationships" xmlns:p="http://schemas.openxmlformats.org/presentationml/2006/main">
   <p:cSld>
     <p:spTree>
@@ -4307,7 +5016,7 @@
 </p:sld>
 </file>
 
-<file path=ppt/slides/slide4.xml><?xml version="1.0" encoding="utf-8"?>
+<file path=ppt/slides/slide5.xml><?xml version="1.0" encoding="utf-8"?>
 <p:sld xmlns:a="http://schemas.openxmlformats.org/drawingml/2006/main" xmlns:r="http://schemas.openxmlformats.org/officeDocument/2006/relationships" xmlns:p="http://schemas.openxmlformats.org/presentationml/2006/main">
   <p:cSld>
     <p:spTree>
@@ -4326,23 +5035,158 @@
       </p:grpSpPr>
       <p:sp>
         <p:nvSpPr>
-          <p:cNvPr id="3" name="Subtitle 2">
-            <a:extLst>
-              <a:ext uri="{FF2B5EF4-FFF2-40B4-BE49-F238E27FC236}">
-                <a16:creationId xmlns:a16="http://schemas.microsoft.com/office/drawing/2014/main" id="{25751FEA-921D-4AA3-A4BC-97F430492528}"/>
-              </a:ext>
-            </a:extLst>
-          </p:cNvPr>
-          <p:cNvSpPr>
-            <a:spLocks noGrp="1"/>
-          </p:cNvSpPr>
-          <p:nvPr>
-            <p:ph type="subTitle" idx="1"/>
+          <p:cNvPr id="2" name="Title 1">
+            <a:extLst>
+              <a:ext uri="{FF2B5EF4-FFF2-40B4-BE49-F238E27FC236}">
+                <a16:creationId xmlns:a16="http://schemas.microsoft.com/office/drawing/2014/main" id="{3823ED87-AD32-4739-9C5C-208049C1F2A7}"/>
+              </a:ext>
+            </a:extLst>
+          </p:cNvPr>
+          <p:cNvSpPr>
+            <a:spLocks noGrp="1"/>
+          </p:cNvSpPr>
+          <p:nvPr>
+            <p:ph type="ctrTitle"/>
           </p:nvPr>
         </p:nvSpPr>
         <p:spPr>
           <a:xfrm>
-            <a:off x="1524000" y="581072"/>
+            <a:off x="1524000" y="233299"/>
+            <a:ext cx="9144000" cy="1008552"/>
+          </a:xfrm>
+        </p:spPr>
+        <p:txBody>
+          <a:bodyPr/>
+          <a:lstStyle/>
+          <a:p>
+            <a:r>
+              <a:rPr lang="en-US" b="1" dirty="0"/>
+              <a:t>Collect</a:t>
+            </a:r>
+          </a:p>
+        </p:txBody>
+      </p:sp>
+      <p:pic>
+        <p:nvPicPr>
+          <p:cNvPr id="5" name="Picture 4" descr="A red apple&#10;&#10;Description automatically generated">
+            <a:extLst>
+              <a:ext uri="{FF2B5EF4-FFF2-40B4-BE49-F238E27FC236}">
+                <a16:creationId xmlns:a16="http://schemas.microsoft.com/office/drawing/2014/main" id="{5222F148-B9D0-47FF-A5E3-802700705EC4}"/>
+              </a:ext>
+            </a:extLst>
+          </p:cNvPr>
+          <p:cNvPicPr>
+            <a:picLocks noChangeAspect="1"/>
+          </p:cNvPicPr>
+          <p:nvPr/>
+        </p:nvPicPr>
+        <p:blipFill>
+          <a:blip r:embed="rId2">
+            <a:extLst>
+              <a:ext uri="{28A0092B-C50C-407E-A947-70E740481C1C}">
+                <a14:useLocalDpi xmlns:a14="http://schemas.microsoft.com/office/drawing/2010/main" val="0"/>
+              </a:ext>
+            </a:extLst>
+          </a:blip>
+          <a:stretch>
+            <a:fillRect/>
+          </a:stretch>
+        </p:blipFill>
+        <p:spPr>
+          <a:xfrm>
+            <a:off x="2643990" y="2669921"/>
+            <a:ext cx="2857500" cy="2857500"/>
+          </a:xfrm>
+          <a:prstGeom prst="rect">
+            <a:avLst/>
+          </a:prstGeom>
+        </p:spPr>
+      </p:pic>
+      <p:pic>
+        <p:nvPicPr>
+          <p:cNvPr id="4" name="Graphic 3">
+            <a:extLst>
+              <a:ext uri="{FF2B5EF4-FFF2-40B4-BE49-F238E27FC236}">
+                <a16:creationId xmlns:a16="http://schemas.microsoft.com/office/drawing/2014/main" id="{6EBD55A4-00D9-4F3B-A5A4-5EB55EFC4AFD}"/>
+              </a:ext>
+            </a:extLst>
+          </p:cNvPr>
+          <p:cNvPicPr>
+            <a:picLocks noChangeAspect="1"/>
+          </p:cNvPicPr>
+          <p:nvPr/>
+        </p:nvPicPr>
+        <p:blipFill>
+          <a:blip r:embed="rId3">
+            <a:extLst>
+              <a:ext uri="{96DAC541-7B7A-43D3-8B79-37D633B846F1}">
+                <asvg:svgBlip xmlns:asvg="http://schemas.microsoft.com/office/drawing/2016/SVG/main" r:embed="rId4"/>
+              </a:ext>
+            </a:extLst>
+          </a:blip>
+          <a:stretch>
+            <a:fillRect/>
+          </a:stretch>
+        </p:blipFill>
+        <p:spPr>
+          <a:xfrm>
+            <a:off x="7085013" y="2977029"/>
+            <a:ext cx="2688907" cy="2664628"/>
+          </a:xfrm>
+          <a:prstGeom prst="rect">
+            <a:avLst/>
+          </a:prstGeom>
+        </p:spPr>
+      </p:pic>
+    </p:spTree>
+    <p:extLst>
+      <p:ext uri="{BB962C8B-B14F-4D97-AF65-F5344CB8AC3E}">
+        <p14:creationId xmlns:p14="http://schemas.microsoft.com/office/powerpoint/2010/main" val="937489262"/>
+      </p:ext>
+    </p:extLst>
+  </p:cSld>
+  <p:clrMapOvr>
+    <a:masterClrMapping/>
+  </p:clrMapOvr>
+</p:sld>
+</file>
+
+<file path=ppt/slides/slide6.xml><?xml version="1.0" encoding="utf-8"?>
+<p:sld xmlns:a="http://schemas.openxmlformats.org/drawingml/2006/main" xmlns:r="http://schemas.openxmlformats.org/officeDocument/2006/relationships" xmlns:p="http://schemas.openxmlformats.org/presentationml/2006/main">
+  <p:cSld>
+    <p:spTree>
+      <p:nvGrpSpPr>
+        <p:cNvPr id="1" name=""/>
+        <p:cNvGrpSpPr/>
+        <p:nvPr/>
+      </p:nvGrpSpPr>
+      <p:grpSpPr>
+        <a:xfrm>
+          <a:off x="0" y="0"/>
+          <a:ext cx="0" cy="0"/>
+          <a:chOff x="0" y="0"/>
+          <a:chExt cx="0" cy="0"/>
+        </a:xfrm>
+      </p:grpSpPr>
+      <p:sp>
+        <p:nvSpPr>
+          <p:cNvPr id="3" name="Subtitle 2">
+            <a:extLst>
+              <a:ext uri="{FF2B5EF4-FFF2-40B4-BE49-F238E27FC236}">
+                <a16:creationId xmlns:a16="http://schemas.microsoft.com/office/drawing/2014/main" id="{25751FEA-921D-4AA3-A4BC-97F430492528}"/>
+              </a:ext>
+            </a:extLst>
+          </p:cNvPr>
+          <p:cNvSpPr>
+            <a:spLocks noGrp="1"/>
+          </p:cNvSpPr>
+          <p:nvPr>
+            <p:ph type="subTitle" idx="1"/>
+          </p:nvPr>
+        </p:nvSpPr>
+        <p:spPr>
+          <a:xfrm>
+            <a:off x="1523998" y="258678"/>
             <a:ext cx="9144000" cy="2062599"/>
           </a:xfrm>
         </p:spPr>
@@ -4439,7 +5283,7 @@
         </p:nvGrpSpPr>
         <p:grpSpPr>
           <a:xfrm>
-            <a:off x="4069308" y="2792103"/>
+            <a:off x="4069307" y="2281357"/>
             <a:ext cx="4053385" cy="2817974"/>
             <a:chOff x="4069308" y="3429000"/>
             <a:chExt cx="4053385" cy="2817974"/>
@@ -4664,7 +5508,7 @@
         </p:nvSpPr>
         <p:spPr>
           <a:xfrm>
-            <a:off x="5548863" y="5110591"/>
+            <a:off x="5548862" y="4599845"/>
             <a:ext cx="1094275" cy="646331"/>
           </a:xfrm>
           <a:prstGeom prst="rect">
@@ -4701,6 +5545,75 @@
                 </a:solidFill>
               </a:rPr>
               <a:t>Backward</a:t>
+            </a:r>
+          </a:p>
+        </p:txBody>
+      </p:sp>
+      <p:sp>
+        <p:nvSpPr>
+          <p:cNvPr id="15" name="Rectangle: Rounded Corners 14">
+            <a:extLst>
+              <a:ext uri="{FF2B5EF4-FFF2-40B4-BE49-F238E27FC236}">
+                <a16:creationId xmlns:a16="http://schemas.microsoft.com/office/drawing/2014/main" id="{A849574F-C32C-4FDF-8209-7056289E3392}"/>
+              </a:ext>
+            </a:extLst>
+          </p:cNvPr>
+          <p:cNvSpPr/>
+          <p:nvPr/>
+        </p:nvSpPr>
+        <p:spPr>
+          <a:xfrm>
+            <a:off x="3244198" y="5544600"/>
+            <a:ext cx="5703604" cy="934720"/>
+          </a:xfrm>
+          <a:prstGeom prst="roundRect">
+            <a:avLst/>
+          </a:prstGeom>
+          <a:solidFill>
+            <a:schemeClr val="bg1"/>
+          </a:solidFill>
+          <a:ln w="76200">
+            <a:solidFill>
+              <a:schemeClr val="tx1"/>
+            </a:solidFill>
+          </a:ln>
+        </p:spPr>
+        <p:style>
+          <a:lnRef idx="2">
+            <a:schemeClr val="accent1">
+              <a:shade val="50000"/>
+            </a:schemeClr>
+          </a:lnRef>
+          <a:fillRef idx="1">
+            <a:schemeClr val="accent1"/>
+          </a:fillRef>
+          <a:effectRef idx="0">
+            <a:schemeClr val="accent1"/>
+          </a:effectRef>
+          <a:fontRef idx="minor">
+            <a:schemeClr val="lt1"/>
+          </a:fontRef>
+        </p:style>
+        <p:txBody>
+          <a:bodyPr rtlCol="0" anchor="ctr"/>
+          <a:lstStyle/>
+          <a:p>
+            <a:pPr algn="ctr"/>
+            <a:r>
+              <a:rPr lang="en-US" sz="2800" dirty="0">
+                <a:ln w="0"/>
+                <a:solidFill>
+                  <a:schemeClr val="tx1"/>
+                </a:solidFill>
+                <a:effectLst>
+                  <a:outerShdw blurRad="38100" dist="19050" dir="2700000" algn="tl" rotWithShape="0">
+                    <a:schemeClr val="dk1">
+                      <a:alpha val="40000"/>
+                    </a:schemeClr>
+                  </a:outerShdw>
+                </a:effectLst>
+              </a:rPr>
+              <a:t>PRESS THE SPACEBAR TO CONITUE</a:t>
             </a:r>
           </a:p>
         </p:txBody>
@@ -4718,7 +5631,418 @@
 </p:sld>
 </file>
 
-<file path=ppt/slides/slide5.xml><?xml version="1.0" encoding="utf-8"?>
+<file path=ppt/slides/slide7.xml><?xml version="1.0" encoding="utf-8"?>
+<p:sld xmlns:a="http://schemas.openxmlformats.org/drawingml/2006/main" xmlns:r="http://schemas.openxmlformats.org/officeDocument/2006/relationships" xmlns:p="http://schemas.openxmlformats.org/presentationml/2006/main">
+  <p:cSld>
+    <p:spTree>
+      <p:nvGrpSpPr>
+        <p:cNvPr id="1" name=""/>
+        <p:cNvGrpSpPr/>
+        <p:nvPr/>
+      </p:nvGrpSpPr>
+      <p:grpSpPr>
+        <a:xfrm>
+          <a:off x="0" y="0"/>
+          <a:ext cx="0" cy="0"/>
+          <a:chOff x="0" y="0"/>
+          <a:chExt cx="0" cy="0"/>
+        </a:xfrm>
+      </p:grpSpPr>
+      <p:sp>
+        <p:nvSpPr>
+          <p:cNvPr id="3" name="Subtitle 2">
+            <a:extLst>
+              <a:ext uri="{FF2B5EF4-FFF2-40B4-BE49-F238E27FC236}">
+                <a16:creationId xmlns:a16="http://schemas.microsoft.com/office/drawing/2014/main" id="{25751FEA-921D-4AA3-A4BC-97F430492528}"/>
+              </a:ext>
+            </a:extLst>
+          </p:cNvPr>
+          <p:cNvSpPr>
+            <a:spLocks noGrp="1"/>
+          </p:cNvSpPr>
+          <p:nvPr>
+            <p:ph type="subTitle" idx="1"/>
+          </p:nvPr>
+        </p:nvSpPr>
+        <p:spPr>
+          <a:xfrm>
+            <a:off x="1524000" y="581072"/>
+            <a:ext cx="9144000" cy="2062599"/>
+          </a:xfrm>
+        </p:spPr>
+        <p:txBody>
+          <a:bodyPr>
+            <a:normAutofit/>
+          </a:bodyPr>
+          <a:lstStyle/>
+          <a:p>
+            <a:r>
+              <a:rPr lang="en-US" sz="3600" b="1" dirty="0"/>
+              <a:t>MOVEMENT CONTROLS</a:t>
+            </a:r>
+          </a:p>
+          <a:p>
+            <a:r>
+              <a:rPr lang="en-US" dirty="0"/>
+              <a:t>To navigate the environment, use the </a:t>
+            </a:r>
+            <a:r>
+              <a:rPr lang="en-US" b="1" dirty="0"/>
+              <a:t>Up-Arrow </a:t>
+            </a:r>
+            <a:r>
+              <a:rPr lang="en-US" dirty="0"/>
+              <a:t>to</a:t>
+            </a:r>
+            <a:r>
+              <a:rPr lang="en-US" b="1" dirty="0"/>
+              <a:t> move forward</a:t>
+            </a:r>
+            <a:r>
+              <a:rPr lang="en-US" dirty="0"/>
+              <a:t>, the</a:t>
+            </a:r>
+            <a:r>
+              <a:rPr lang="en-US" b="1" dirty="0"/>
+              <a:t> Down-Arrow </a:t>
+            </a:r>
+            <a:r>
+              <a:rPr lang="en-US" dirty="0"/>
+              <a:t>to</a:t>
+            </a:r>
+            <a:r>
+              <a:rPr lang="en-US" b="1" dirty="0"/>
+              <a:t> move backwards</a:t>
+            </a:r>
+            <a:r>
+              <a:rPr lang="en-US" dirty="0"/>
+              <a:t> and the </a:t>
+            </a:r>
+            <a:r>
+              <a:rPr lang="en-US" b="1" dirty="0"/>
+              <a:t>Left-Arrow</a:t>
+            </a:r>
+            <a:r>
+              <a:rPr lang="en-US" dirty="0"/>
+              <a:t> and </a:t>
+            </a:r>
+            <a:r>
+              <a:rPr lang="en-US" b="1" dirty="0"/>
+              <a:t>Right-Arrow</a:t>
+            </a:r>
+            <a:r>
+              <a:rPr lang="en-US" dirty="0"/>
+              <a:t> to </a:t>
+            </a:r>
+            <a:r>
+              <a:rPr lang="en-US" b="1" dirty="0"/>
+              <a:t>rotate</a:t>
+            </a:r>
+            <a:r>
+              <a:rPr lang="en-US" dirty="0"/>
+              <a:t>.</a:t>
+            </a:r>
+            <a:r>
+              <a:rPr lang="en-US" b="1" dirty="0"/>
+              <a:t> </a:t>
+            </a:r>
+          </a:p>
+        </p:txBody>
+      </p:sp>
+      <p:grpSp>
+        <p:nvGrpSpPr>
+          <p:cNvPr id="10" name="Group 9">
+            <a:extLst>
+              <a:ext uri="{FF2B5EF4-FFF2-40B4-BE49-F238E27FC236}">
+                <a16:creationId xmlns:a16="http://schemas.microsoft.com/office/drawing/2014/main" id="{3CBB7903-5AED-4A5E-9E3A-8ECC7F2C32B2}"/>
+              </a:ext>
+            </a:extLst>
+          </p:cNvPr>
+          <p:cNvGrpSpPr/>
+          <p:nvPr/>
+        </p:nvGrpSpPr>
+        <p:grpSpPr>
+          <a:xfrm>
+            <a:off x="3986930" y="2479066"/>
+            <a:ext cx="4053385" cy="2817974"/>
+            <a:chOff x="4069308" y="3429000"/>
+            <a:chExt cx="4053385" cy="2817974"/>
+          </a:xfrm>
+        </p:grpSpPr>
+        <p:pic>
+          <p:nvPicPr>
+            <p:cNvPr id="11" name="Picture 2" descr="Image result for arrow keys keyboard">
+              <a:extLst>
+                <a:ext uri="{FF2B5EF4-FFF2-40B4-BE49-F238E27FC236}">
+                  <a16:creationId xmlns:a16="http://schemas.microsoft.com/office/drawing/2014/main" id="{4A4E17FA-5C08-4188-8056-6C6BA927F747}"/>
+                </a:ext>
+              </a:extLst>
+            </p:cNvPr>
+            <p:cNvPicPr>
+              <a:picLocks noChangeAspect="1" noChangeArrowheads="1"/>
+            </p:cNvPicPr>
+            <p:nvPr/>
+          </p:nvPicPr>
+          <p:blipFill>
+            <a:blip r:embed="rId2">
+              <a:extLst>
+                <a:ext uri="{28A0092B-C50C-407E-A947-70E740481C1C}">
+                  <a14:useLocalDpi xmlns:a14="http://schemas.microsoft.com/office/drawing/2010/main" val="0"/>
+                </a:ext>
+              </a:extLst>
+            </a:blip>
+            <a:srcRect/>
+            <a:stretch>
+              <a:fillRect/>
+            </a:stretch>
+          </p:blipFill>
+          <p:spPr bwMode="auto">
+            <a:xfrm>
+              <a:off x="4760435" y="3575845"/>
+              <a:ext cx="2671129" cy="2671129"/>
+            </a:xfrm>
+            <a:prstGeom prst="rect">
+              <a:avLst/>
+            </a:prstGeom>
+            <a:noFill/>
+            <a:extLst>
+              <a:ext uri="{909E8E84-426E-40DD-AFC4-6F175D3DCCD1}">
+                <a14:hiddenFill xmlns:a14="http://schemas.microsoft.com/office/drawing/2010/main">
+                  <a:solidFill>
+                    <a:srgbClr val="FFFFFF"/>
+                  </a:solidFill>
+                </a14:hiddenFill>
+              </a:ext>
+            </a:extLst>
+          </p:spPr>
+        </p:pic>
+        <p:sp>
+          <p:nvSpPr>
+            <p:cNvPr id="12" name="TextBox 11">
+              <a:extLst>
+                <a:ext uri="{FF2B5EF4-FFF2-40B4-BE49-F238E27FC236}">
+                  <a16:creationId xmlns:a16="http://schemas.microsoft.com/office/drawing/2014/main" id="{A8931F61-589B-4799-934B-275B6EF30B25}"/>
+                </a:ext>
+              </a:extLst>
+            </p:cNvPr>
+            <p:cNvSpPr txBox="1"/>
+            <p:nvPr/>
+          </p:nvSpPr>
+          <p:spPr>
+            <a:xfrm>
+              <a:off x="5615282" y="3429000"/>
+              <a:ext cx="962508" cy="646331"/>
+            </a:xfrm>
+            <a:prstGeom prst="rect">
+              <a:avLst/>
+            </a:prstGeom>
+            <a:noFill/>
+          </p:spPr>
+          <p:txBody>
+            <a:bodyPr wrap="none" rtlCol="0">
+              <a:spAutoFit/>
+            </a:bodyPr>
+            <a:lstStyle/>
+            <a:p>
+              <a:pPr algn="ctr"/>
+              <a:r>
+                <a:rPr lang="en-US" dirty="0">
+                  <a:solidFill>
+                    <a:schemeClr val="accent1"/>
+                  </a:solidFill>
+                </a:rPr>
+                <a:t>Move </a:t>
+              </a:r>
+              <a:br>
+                <a:rPr lang="en-US" dirty="0">
+                  <a:solidFill>
+                    <a:schemeClr val="accent1"/>
+                  </a:solidFill>
+                </a:rPr>
+              </a:br>
+              <a:r>
+                <a:rPr lang="en-US" dirty="0">
+                  <a:solidFill>
+                    <a:schemeClr val="accent1"/>
+                  </a:solidFill>
+                </a:rPr>
+                <a:t>Forward</a:t>
+              </a:r>
+            </a:p>
+          </p:txBody>
+        </p:sp>
+        <p:sp>
+          <p:nvSpPr>
+            <p:cNvPr id="13" name="TextBox 12">
+              <a:extLst>
+                <a:ext uri="{FF2B5EF4-FFF2-40B4-BE49-F238E27FC236}">
+                  <a16:creationId xmlns:a16="http://schemas.microsoft.com/office/drawing/2014/main" id="{2491A77D-1E2E-4B96-BF57-36C9373A1EE2}"/>
+                </a:ext>
+              </a:extLst>
+            </p:cNvPr>
+            <p:cNvSpPr txBox="1"/>
+            <p:nvPr/>
+          </p:nvSpPr>
+          <p:spPr>
+            <a:xfrm>
+              <a:off x="4069308" y="5024458"/>
+              <a:ext cx="799258" cy="646331"/>
+            </a:xfrm>
+            <a:prstGeom prst="rect">
+              <a:avLst/>
+            </a:prstGeom>
+            <a:noFill/>
+          </p:spPr>
+          <p:txBody>
+            <a:bodyPr wrap="none" rtlCol="0">
+              <a:spAutoFit/>
+            </a:bodyPr>
+            <a:lstStyle/>
+            <a:p>
+              <a:pPr algn="ctr"/>
+              <a:r>
+                <a:rPr lang="en-US" dirty="0">
+                  <a:solidFill>
+                    <a:schemeClr val="accent1"/>
+                  </a:solidFill>
+                </a:rPr>
+                <a:t>Rotate</a:t>
+              </a:r>
+            </a:p>
+            <a:p>
+              <a:pPr algn="ctr"/>
+              <a:r>
+                <a:rPr lang="en-US" dirty="0">
+                  <a:solidFill>
+                    <a:schemeClr val="accent1"/>
+                  </a:solidFill>
+                </a:rPr>
+                <a:t>Left</a:t>
+              </a:r>
+            </a:p>
+          </p:txBody>
+        </p:sp>
+        <p:sp>
+          <p:nvSpPr>
+            <p:cNvPr id="14" name="TextBox 13">
+              <a:extLst>
+                <a:ext uri="{FF2B5EF4-FFF2-40B4-BE49-F238E27FC236}">
+                  <a16:creationId xmlns:a16="http://schemas.microsoft.com/office/drawing/2014/main" id="{9A7D6FC9-2777-4538-ACF6-216EC769D206}"/>
+                </a:ext>
+              </a:extLst>
+            </p:cNvPr>
+            <p:cNvSpPr txBox="1"/>
+            <p:nvPr/>
+          </p:nvSpPr>
+          <p:spPr>
+            <a:xfrm>
+              <a:off x="7323435" y="5015450"/>
+              <a:ext cx="799258" cy="646331"/>
+            </a:xfrm>
+            <a:prstGeom prst="rect">
+              <a:avLst/>
+            </a:prstGeom>
+            <a:noFill/>
+          </p:spPr>
+          <p:txBody>
+            <a:bodyPr wrap="none" rtlCol="0">
+              <a:spAutoFit/>
+            </a:bodyPr>
+            <a:lstStyle/>
+            <a:p>
+              <a:pPr algn="ctr"/>
+              <a:r>
+                <a:rPr lang="en-US" dirty="0">
+                  <a:solidFill>
+                    <a:schemeClr val="accent1"/>
+                  </a:solidFill>
+                </a:rPr>
+                <a:t>Rotate</a:t>
+              </a:r>
+            </a:p>
+            <a:p>
+              <a:pPr algn="ctr"/>
+              <a:r>
+                <a:rPr lang="en-US" dirty="0">
+                  <a:solidFill>
+                    <a:schemeClr val="accent1"/>
+                  </a:solidFill>
+                </a:rPr>
+                <a:t>Right</a:t>
+              </a:r>
+            </a:p>
+          </p:txBody>
+        </p:sp>
+      </p:grpSp>
+      <p:sp>
+        <p:nvSpPr>
+          <p:cNvPr id="9" name="TextBox 8">
+            <a:extLst>
+              <a:ext uri="{FF2B5EF4-FFF2-40B4-BE49-F238E27FC236}">
+                <a16:creationId xmlns:a16="http://schemas.microsoft.com/office/drawing/2014/main" id="{E8D9E763-2924-4050-82B6-B9E1634520CA}"/>
+              </a:ext>
+            </a:extLst>
+          </p:cNvPr>
+          <p:cNvSpPr txBox="1"/>
+          <p:nvPr/>
+        </p:nvSpPr>
+        <p:spPr>
+          <a:xfrm>
+            <a:off x="5466485" y="4797554"/>
+            <a:ext cx="1094275" cy="646331"/>
+          </a:xfrm>
+          <a:prstGeom prst="rect">
+            <a:avLst/>
+          </a:prstGeom>
+          <a:noFill/>
+        </p:spPr>
+        <p:txBody>
+          <a:bodyPr wrap="none" rtlCol="0">
+            <a:spAutoFit/>
+          </a:bodyPr>
+          <a:lstStyle/>
+          <a:p>
+            <a:pPr algn="ctr"/>
+            <a:r>
+              <a:rPr lang="en-US" dirty="0">
+                <a:solidFill>
+                  <a:schemeClr val="accent1"/>
+                </a:solidFill>
+              </a:rPr>
+              <a:t>Move </a:t>
+            </a:r>
+            <a:br>
+              <a:rPr lang="en-US" dirty="0">
+                <a:solidFill>
+                  <a:schemeClr val="accent1"/>
+                </a:solidFill>
+              </a:rPr>
+            </a:br>
+            <a:r>
+              <a:rPr lang="en-US" dirty="0">
+                <a:solidFill>
+                  <a:schemeClr val="accent1"/>
+                </a:solidFill>
+              </a:rPr>
+              <a:t>Backward</a:t>
+            </a:r>
+          </a:p>
+        </p:txBody>
+      </p:sp>
+    </p:spTree>
+    <p:extLst>
+      <p:ext uri="{BB962C8B-B14F-4D97-AF65-F5344CB8AC3E}">
+        <p14:creationId xmlns:p14="http://schemas.microsoft.com/office/powerpoint/2010/main" val="3364946813"/>
+      </p:ext>
+    </p:extLst>
+  </p:cSld>
+  <p:clrMapOvr>
+    <a:masterClrMapping/>
+  </p:clrMapOvr>
+</p:sld>
+</file>
+
+<file path=ppt/slides/slide8.xml><?xml version="1.0" encoding="utf-8"?>
 <p:sld xmlns:a="http://schemas.openxmlformats.org/drawingml/2006/main" xmlns:r="http://schemas.openxmlformats.org/officeDocument/2006/relationships" xmlns:p="http://schemas.openxmlformats.org/presentationml/2006/main">
   <p:cSld>
     <p:spTree>
@@ -5046,7 +6370,7 @@
 </p:sld>
 </file>
 
-<file path=ppt/slides/slide6.xml><?xml version="1.0" encoding="utf-8"?>
+<file path=ppt/slides/slide9.xml><?xml version="1.0" encoding="utf-8"?>
 <p:sld xmlns:a="http://schemas.openxmlformats.org/drawingml/2006/main" xmlns:r="http://schemas.openxmlformats.org/officeDocument/2006/relationships" xmlns:p="http://schemas.openxmlformats.org/presentationml/2006/main">
   <p:cSld>
     <p:spTree>
@@ -5123,396 +6447,6 @@
     <p:extLst>
       <p:ext uri="{BB962C8B-B14F-4D97-AF65-F5344CB8AC3E}">
         <p14:creationId xmlns:p14="http://schemas.microsoft.com/office/powerpoint/2010/main" val="3771457625"/>
-      </p:ext>
-    </p:extLst>
-  </p:cSld>
-  <p:clrMapOvr>
-    <a:masterClrMapping/>
-  </p:clrMapOvr>
-</p:sld>
-</file>
-
-<file path=ppt/slides/slide7.xml><?xml version="1.0" encoding="utf-8"?>
-<p:sld xmlns:a="http://schemas.openxmlformats.org/drawingml/2006/main" xmlns:r="http://schemas.openxmlformats.org/officeDocument/2006/relationships" xmlns:p="http://schemas.openxmlformats.org/presentationml/2006/main">
-  <p:cSld>
-    <p:spTree>
-      <p:nvGrpSpPr>
-        <p:cNvPr id="1" name=""/>
-        <p:cNvGrpSpPr/>
-        <p:nvPr/>
-      </p:nvGrpSpPr>
-      <p:grpSpPr>
-        <a:xfrm>
-          <a:off x="0" y="0"/>
-          <a:ext cx="0" cy="0"/>
-          <a:chOff x="0" y="0"/>
-          <a:chExt cx="0" cy="0"/>
-        </a:xfrm>
-      </p:grpSpPr>
-      <p:sp>
-        <p:nvSpPr>
-          <p:cNvPr id="2" name="Title 1">
-            <a:extLst>
-              <a:ext uri="{FF2B5EF4-FFF2-40B4-BE49-F238E27FC236}">
-                <a16:creationId xmlns:a16="http://schemas.microsoft.com/office/drawing/2014/main" id="{3823ED87-AD32-4739-9C5C-208049C1F2A7}"/>
-              </a:ext>
-            </a:extLst>
-          </p:cNvPr>
-          <p:cNvSpPr>
-            <a:spLocks noGrp="1"/>
-          </p:cNvSpPr>
-          <p:nvPr>
-            <p:ph type="ctrTitle"/>
-          </p:nvPr>
-        </p:nvSpPr>
-        <p:spPr>
-          <a:xfrm>
-            <a:off x="1524000" y="491083"/>
-            <a:ext cx="9144000" cy="1008552"/>
-          </a:xfrm>
-        </p:spPr>
-        <p:txBody>
-          <a:bodyPr/>
-          <a:lstStyle/>
-          <a:p>
-            <a:r>
-              <a:rPr lang="en-US" b="1" dirty="0"/>
-              <a:t>Collect the Items!</a:t>
-            </a:r>
-          </a:p>
-        </p:txBody>
-      </p:sp>
-      <p:grpSp>
-        <p:nvGrpSpPr>
-          <p:cNvPr id="17" name="Group 16">
-            <a:extLst>
-              <a:ext uri="{FF2B5EF4-FFF2-40B4-BE49-F238E27FC236}">
-                <a16:creationId xmlns:a16="http://schemas.microsoft.com/office/drawing/2014/main" id="{8A995936-5E47-4957-902C-A07C271D5CFF}"/>
-              </a:ext>
-            </a:extLst>
-          </p:cNvPr>
-          <p:cNvGrpSpPr/>
-          <p:nvPr/>
-        </p:nvGrpSpPr>
-        <p:grpSpPr>
-          <a:xfrm>
-            <a:off x="286429" y="2149264"/>
-            <a:ext cx="11619142" cy="4525002"/>
-            <a:chOff x="163616" y="2149264"/>
-            <a:chExt cx="11619142" cy="4525002"/>
-          </a:xfrm>
-        </p:grpSpPr>
-        <p:pic>
-          <p:nvPicPr>
-            <p:cNvPr id="5" name="Picture 4" descr="A red apple&#10;&#10;Description automatically generated">
-              <a:extLst>
-                <a:ext uri="{FF2B5EF4-FFF2-40B4-BE49-F238E27FC236}">
-                  <a16:creationId xmlns:a16="http://schemas.microsoft.com/office/drawing/2014/main" id="{5222F148-B9D0-47FF-A5E3-802700705EC4}"/>
-                </a:ext>
-              </a:extLst>
-            </p:cNvPr>
-            <p:cNvPicPr>
-              <a:picLocks noChangeAspect="1"/>
-            </p:cNvPicPr>
-            <p:nvPr/>
-          </p:nvPicPr>
-          <p:blipFill>
-            <a:blip r:embed="rId2">
-              <a:extLst>
-                <a:ext uri="{28A0092B-C50C-407E-A947-70E740481C1C}">
-                  <a14:useLocalDpi xmlns:a14="http://schemas.microsoft.com/office/drawing/2010/main" val="0"/>
-                </a:ext>
-              </a:extLst>
-            </a:blip>
-            <a:stretch>
-              <a:fillRect/>
-            </a:stretch>
-          </p:blipFill>
-          <p:spPr>
-            <a:xfrm>
-              <a:off x="163616" y="3254842"/>
-              <a:ext cx="2857500" cy="2857500"/>
-            </a:xfrm>
-            <a:prstGeom prst="rect">
-              <a:avLst/>
-            </a:prstGeom>
-          </p:spPr>
-        </p:pic>
-        <p:pic>
-          <p:nvPicPr>
-            <p:cNvPr id="14" name="Picture 13" descr="A picture containing sitting, laying&#10;&#10;Description automatically generated">
-              <a:extLst>
-                <a:ext uri="{FF2B5EF4-FFF2-40B4-BE49-F238E27FC236}">
-                  <a16:creationId xmlns:a16="http://schemas.microsoft.com/office/drawing/2014/main" id="{125EED36-0B92-46E5-AA24-EE9E62244456}"/>
-                </a:ext>
-              </a:extLst>
-            </p:cNvPr>
-            <p:cNvPicPr>
-              <a:picLocks noChangeAspect="1"/>
-            </p:cNvPicPr>
-            <p:nvPr/>
-          </p:nvPicPr>
-          <p:blipFill>
-            <a:blip r:embed="rId3">
-              <a:extLst>
-                <a:ext uri="{28A0092B-C50C-407E-A947-70E740481C1C}">
-                  <a14:useLocalDpi xmlns:a14="http://schemas.microsoft.com/office/drawing/2010/main" val="0"/>
-                </a:ext>
-              </a:extLst>
-            </a:blip>
-            <a:stretch>
-              <a:fillRect/>
-            </a:stretch>
-          </p:blipFill>
-          <p:spPr>
-            <a:xfrm>
-              <a:off x="3820913" y="2581578"/>
-              <a:ext cx="4171955" cy="4092688"/>
-            </a:xfrm>
-            <a:prstGeom prst="rect">
-              <a:avLst/>
-            </a:prstGeom>
-          </p:spPr>
-        </p:pic>
-        <p:pic>
-          <p:nvPicPr>
-            <p:cNvPr id="16" name="Picture 15" descr="A picture containing vase, table, flower, sitting&#10;&#10;Description automatically generated">
-              <a:extLst>
-                <a:ext uri="{FF2B5EF4-FFF2-40B4-BE49-F238E27FC236}">
-                  <a16:creationId xmlns:a16="http://schemas.microsoft.com/office/drawing/2014/main" id="{9C142CEE-C2A1-4C69-98C8-24C0348F36CF}"/>
-                </a:ext>
-              </a:extLst>
-            </p:cNvPr>
-            <p:cNvPicPr>
-              <a:picLocks noChangeAspect="1"/>
-            </p:cNvPicPr>
-            <p:nvPr/>
-          </p:nvPicPr>
-          <p:blipFill>
-            <a:blip r:embed="rId4">
-              <a:extLst>
-                <a:ext uri="{28A0092B-C50C-407E-A947-70E740481C1C}">
-                  <a14:useLocalDpi xmlns:a14="http://schemas.microsoft.com/office/drawing/2010/main" val="0"/>
-                </a:ext>
-              </a:extLst>
-            </a:blip>
-            <a:stretch>
-              <a:fillRect/>
-            </a:stretch>
-          </p:blipFill>
-          <p:spPr>
-            <a:xfrm>
-              <a:off x="8792664" y="2149264"/>
-              <a:ext cx="2990094" cy="4114808"/>
-            </a:xfrm>
-            <a:prstGeom prst="rect">
-              <a:avLst/>
-            </a:prstGeom>
-          </p:spPr>
-        </p:pic>
-      </p:grpSp>
-    </p:spTree>
-    <p:extLst>
-      <p:ext uri="{BB962C8B-B14F-4D97-AF65-F5344CB8AC3E}">
-        <p14:creationId xmlns:p14="http://schemas.microsoft.com/office/powerpoint/2010/main" val="4023285758"/>
-      </p:ext>
-    </p:extLst>
-  </p:cSld>
-  <p:clrMapOvr>
-    <a:masterClrMapping/>
-  </p:clrMapOvr>
-</p:sld>
-</file>
-
-<file path=ppt/slides/slide8.xml><?xml version="1.0" encoding="utf-8"?>
-<p:sld xmlns:a="http://schemas.openxmlformats.org/drawingml/2006/main" xmlns:r="http://schemas.openxmlformats.org/officeDocument/2006/relationships" xmlns:p="http://schemas.openxmlformats.org/presentationml/2006/main">
-  <p:cSld>
-    <p:spTree>
-      <p:nvGrpSpPr>
-        <p:cNvPr id="1" name=""/>
-        <p:cNvGrpSpPr/>
-        <p:nvPr/>
-      </p:nvGrpSpPr>
-      <p:grpSpPr>
-        <a:xfrm>
-          <a:off x="0" y="0"/>
-          <a:ext cx="0" cy="0"/>
-          <a:chOff x="0" y="0"/>
-          <a:chExt cx="0" cy="0"/>
-        </a:xfrm>
-      </p:grpSpPr>
-      <p:sp>
-        <p:nvSpPr>
-          <p:cNvPr id="2" name="Title 1">
-            <a:extLst>
-              <a:ext uri="{FF2B5EF4-FFF2-40B4-BE49-F238E27FC236}">
-                <a16:creationId xmlns:a16="http://schemas.microsoft.com/office/drawing/2014/main" id="{3823ED87-AD32-4739-9C5C-208049C1F2A7}"/>
-              </a:ext>
-            </a:extLst>
-          </p:cNvPr>
-          <p:cNvSpPr>
-            <a:spLocks noGrp="1"/>
-          </p:cNvSpPr>
-          <p:nvPr>
-            <p:ph type="ctrTitle"/>
-          </p:nvPr>
-        </p:nvSpPr>
-        <p:spPr>
-          <a:xfrm>
-            <a:off x="1523999" y="220738"/>
-            <a:ext cx="9144000" cy="1008552"/>
-          </a:xfrm>
-        </p:spPr>
-        <p:txBody>
-          <a:bodyPr/>
-          <a:lstStyle/>
-          <a:p>
-            <a:r>
-              <a:rPr lang="en-US" b="1" dirty="0"/>
-              <a:t>Find</a:t>
-            </a:r>
-          </a:p>
-        </p:txBody>
-      </p:sp>
-      <p:pic>
-        <p:nvPicPr>
-          <p:cNvPr id="14" name="Picture 13" descr="A picture containing sitting, laying&#10;&#10;Description automatically generated">
-            <a:extLst>
-              <a:ext uri="{FF2B5EF4-FFF2-40B4-BE49-F238E27FC236}">
-                <a16:creationId xmlns:a16="http://schemas.microsoft.com/office/drawing/2014/main" id="{125EED36-0B92-46E5-AA24-EE9E62244456}"/>
-              </a:ext>
-            </a:extLst>
-          </p:cNvPr>
-          <p:cNvPicPr>
-            <a:picLocks noChangeAspect="1"/>
-          </p:cNvPicPr>
-          <p:nvPr/>
-        </p:nvPicPr>
-        <p:blipFill>
-          <a:blip r:embed="rId2">
-            <a:extLst>
-              <a:ext uri="{28A0092B-C50C-407E-A947-70E740481C1C}">
-                <a14:useLocalDpi xmlns:a14="http://schemas.microsoft.com/office/drawing/2010/main" val="0"/>
-              </a:ext>
-            </a:extLst>
-          </a:blip>
-          <a:stretch>
-            <a:fillRect/>
-          </a:stretch>
-        </p:blipFill>
-        <p:spPr>
-          <a:xfrm>
-            <a:off x="4010022" y="1382656"/>
-            <a:ext cx="4171955" cy="4092688"/>
-          </a:xfrm>
-          <a:prstGeom prst="rect">
-            <a:avLst/>
-          </a:prstGeom>
-        </p:spPr>
-      </p:pic>
-    </p:spTree>
-    <p:extLst>
-      <p:ext uri="{BB962C8B-B14F-4D97-AF65-F5344CB8AC3E}">
-        <p14:creationId xmlns:p14="http://schemas.microsoft.com/office/powerpoint/2010/main" val="3679336169"/>
-      </p:ext>
-    </p:extLst>
-  </p:cSld>
-  <p:clrMapOvr>
-    <a:masterClrMapping/>
-  </p:clrMapOvr>
-</p:sld>
-</file>
-
-<file path=ppt/slides/slide9.xml><?xml version="1.0" encoding="utf-8"?>
-<p:sld xmlns:a="http://schemas.openxmlformats.org/drawingml/2006/main" xmlns:r="http://schemas.openxmlformats.org/officeDocument/2006/relationships" xmlns:p="http://schemas.openxmlformats.org/presentationml/2006/main">
-  <p:cSld>
-    <p:spTree>
-      <p:nvGrpSpPr>
-        <p:cNvPr id="1" name=""/>
-        <p:cNvGrpSpPr/>
-        <p:nvPr/>
-      </p:nvGrpSpPr>
-      <p:grpSpPr>
-        <a:xfrm>
-          <a:off x="0" y="0"/>
-          <a:ext cx="0" cy="0"/>
-          <a:chOff x="0" y="0"/>
-          <a:chExt cx="0" cy="0"/>
-        </a:xfrm>
-      </p:grpSpPr>
-      <p:sp>
-        <p:nvSpPr>
-          <p:cNvPr id="2" name="Title 1">
-            <a:extLst>
-              <a:ext uri="{FF2B5EF4-FFF2-40B4-BE49-F238E27FC236}">
-                <a16:creationId xmlns:a16="http://schemas.microsoft.com/office/drawing/2014/main" id="{3823ED87-AD32-4739-9C5C-208049C1F2A7}"/>
-              </a:ext>
-            </a:extLst>
-          </p:cNvPr>
-          <p:cNvSpPr>
-            <a:spLocks noGrp="1"/>
-          </p:cNvSpPr>
-          <p:nvPr>
-            <p:ph type="ctrTitle"/>
-          </p:nvPr>
-        </p:nvSpPr>
-        <p:spPr>
-          <a:xfrm>
-            <a:off x="1524000" y="491083"/>
-            <a:ext cx="9144000" cy="1008552"/>
-          </a:xfrm>
-        </p:spPr>
-        <p:txBody>
-          <a:bodyPr/>
-          <a:lstStyle/>
-          <a:p>
-            <a:r>
-              <a:rPr lang="en-US" b="1" dirty="0"/>
-              <a:t>Find</a:t>
-            </a:r>
-          </a:p>
-        </p:txBody>
-      </p:sp>
-      <p:pic>
-        <p:nvPicPr>
-          <p:cNvPr id="5" name="Picture 4" descr="A red apple&#10;&#10;Description automatically generated">
-            <a:extLst>
-              <a:ext uri="{FF2B5EF4-FFF2-40B4-BE49-F238E27FC236}">
-                <a16:creationId xmlns:a16="http://schemas.microsoft.com/office/drawing/2014/main" id="{5222F148-B9D0-47FF-A5E3-802700705EC4}"/>
-              </a:ext>
-            </a:extLst>
-          </p:cNvPr>
-          <p:cNvPicPr>
-            <a:picLocks noChangeAspect="1"/>
-          </p:cNvPicPr>
-          <p:nvPr/>
-        </p:nvPicPr>
-        <p:blipFill>
-          <a:blip r:embed="rId2">
-            <a:extLst>
-              <a:ext uri="{28A0092B-C50C-407E-A947-70E740481C1C}">
-                <a14:useLocalDpi xmlns:a14="http://schemas.microsoft.com/office/drawing/2010/main" val="0"/>
-              </a:ext>
-            </a:extLst>
-          </a:blip>
-          <a:stretch>
-            <a:fillRect/>
-          </a:stretch>
-        </p:blipFill>
-        <p:spPr>
-          <a:xfrm>
-            <a:off x="4667250" y="2296709"/>
-            <a:ext cx="2857500" cy="2857500"/>
-          </a:xfrm>
-          <a:prstGeom prst="rect">
-            <a:avLst/>
-          </a:prstGeom>
-        </p:spPr>
-      </p:pic>
-    </p:spTree>
-    <p:extLst>
-      <p:ext uri="{BB962C8B-B14F-4D97-AF65-F5344CB8AC3E}">
-        <p14:creationId xmlns:p14="http://schemas.microsoft.com/office/powerpoint/2010/main" val="3574232862"/>
       </p:ext>
     </p:extLst>
   </p:cSld>

</xml_diff>